<commit_message>
added week 2 details
</commit_message>
<xml_diff>
--- a/202110-Burnley/Microsoft Power BI training Burnley Oct21.pptx
+++ b/202110-Burnley/Microsoft Power BI training Burnley Oct21.pptx
@@ -5,7 +5,7 @@
     <p:sldMasterId id="2147483648" r:id="rId1"/>
   </p:sldMasterIdLst>
   <p:notesMasterIdLst>
-    <p:notesMasterId r:id="rId26"/>
+    <p:notesMasterId r:id="rId46"/>
   </p:notesMasterIdLst>
   <p:sldIdLst>
     <p:sldId id="257" r:id="rId2"/>
@@ -30,8 +30,28 @@
     <p:sldId id="2076137150" r:id="rId21"/>
     <p:sldId id="2076137151" r:id="rId22"/>
     <p:sldId id="2076137138" r:id="rId23"/>
-    <p:sldId id="2076137155" r:id="rId24"/>
-    <p:sldId id="2076137154" r:id="rId25"/>
+    <p:sldId id="2076137195" r:id="rId24"/>
+    <p:sldId id="2076137155" r:id="rId25"/>
+    <p:sldId id="2076137154" r:id="rId26"/>
+    <p:sldId id="2076137190" r:id="rId27"/>
+    <p:sldId id="2076137198" r:id="rId28"/>
+    <p:sldId id="2076137163" r:id="rId29"/>
+    <p:sldId id="2076137166" r:id="rId30"/>
+    <p:sldId id="2076137175" r:id="rId31"/>
+    <p:sldId id="2076137201" r:id="rId32"/>
+    <p:sldId id="2076137170" r:id="rId33"/>
+    <p:sldId id="2076137165" r:id="rId34"/>
+    <p:sldId id="2076137202" r:id="rId35"/>
+    <p:sldId id="2076137203" r:id="rId36"/>
+    <p:sldId id="2076137193" r:id="rId37"/>
+    <p:sldId id="2076137157" r:id="rId38"/>
+    <p:sldId id="2076137191" r:id="rId39"/>
+    <p:sldId id="2076137192" r:id="rId40"/>
+    <p:sldId id="2076137189" r:id="rId41"/>
+    <p:sldId id="2076137197" r:id="rId42"/>
+    <p:sldId id="2076137164" r:id="rId43"/>
+    <p:sldId id="2076137194" r:id="rId44"/>
+    <p:sldId id="2076137196" r:id="rId45"/>
   </p:sldIdLst>
   <p:sldSz cx="12192000" cy="6858000"/>
   <p:notesSz cx="6858000" cy="9144000"/>
@@ -130,6 +150,11 @@
       </a:defRPr>
     </a:lvl9pPr>
   </p:defaultTextStyle>
+  <p:extLst>
+    <p:ext uri="{EFAFB233-063F-42B5-8137-9DF3F51BA10A}">
+      <p15:sldGuideLst xmlns:p15="http://schemas.microsoft.com/office/powerpoint/2012/main"/>
+    </p:ext>
+  </p:extLst>
 </p:presentation>
 </file>
 
@@ -215,7 +240,7 @@
           <a:p>
             <a:fld id="{B3D8D8A6-1ED3-41DA-9A43-D0F70D2E5BEB}" type="datetimeFigureOut">
               <a:rPr lang="en-GB" smtClean="0"/>
-              <a:t>11/10/2021</a:t>
+              <a:t>18/10/2021</a:t>
             </a:fld>
             <a:endParaRPr lang="en-GB"/>
           </a:p>
@@ -779,7 +804,7 @@
           <a:p>
             <a:fld id="{38EEC551-8CDA-4EB6-89BB-2A86C9F091C8}" type="datetime8">
               <a:rPr lang="en-US" smtClean="0"/>
-              <a:t>10/11/2021 11:37 AM</a:t>
+              <a:t>10/18/2021 9:00 AM</a:t>
             </a:fld>
             <a:endParaRPr lang="en-US"/>
           </a:p>
@@ -947,7 +972,7 @@
           <a:p>
             <a:fld id="{38EEC551-8CDA-4EB6-89BB-2A86C9F091C8}" type="datetime8">
               <a:rPr lang="en-US" smtClean="0"/>
-              <a:t>10/11/2021 11:37 AM</a:t>
+              <a:t>10/18/2021 9:00 AM</a:t>
             </a:fld>
             <a:endParaRPr lang="en-US"/>
           </a:p>
@@ -1055,7 +1080,7 @@
           <a:p>
             <a:fld id="{570CADB5-E544-48EA-AB0B-798B2BA47965}" type="slidenum">
               <a:rPr lang="en-GB" smtClean="0"/>
-              <a:t>23</a:t>
+              <a:t>24</a:t>
             </a:fld>
             <a:endParaRPr lang="en-GB"/>
           </a:p>
@@ -1065,6 +1090,90 @@
     <p:extLst>
       <p:ext uri="{BB962C8B-B14F-4D97-AF65-F5344CB8AC3E}">
         <p14:creationId xmlns:p14="http://schemas.microsoft.com/office/powerpoint/2010/main" val="2450912631"/>
+      </p:ext>
+    </p:extLst>
+  </p:cSld>
+  <p:clrMapOvr>
+    <a:masterClrMapping/>
+  </p:clrMapOvr>
+</p:notes>
+</file>
+
+<file path=ppt/notesSlides/notesSlide6.xml><?xml version="1.0" encoding="utf-8"?>
+<p:notes xmlns:a="http://schemas.openxmlformats.org/drawingml/2006/main" xmlns:r="http://schemas.openxmlformats.org/officeDocument/2006/relationships" xmlns:p="http://schemas.openxmlformats.org/presentationml/2006/main">
+  <p:cSld>
+    <p:spTree>
+      <p:nvGrpSpPr>
+        <p:cNvPr id="1" name=""/>
+        <p:cNvGrpSpPr/>
+        <p:nvPr/>
+      </p:nvGrpSpPr>
+      <p:grpSpPr>
+        <a:xfrm>
+          <a:off x="0" y="0"/>
+          <a:ext cx="0" cy="0"/>
+          <a:chOff x="0" y="0"/>
+          <a:chExt cx="0" cy="0"/>
+        </a:xfrm>
+      </p:grpSpPr>
+      <p:sp>
+        <p:nvSpPr>
+          <p:cNvPr id="2" name="Slide Image Placeholder 1"/>
+          <p:cNvSpPr>
+            <a:spLocks noGrp="1" noRot="1" noChangeAspect="1"/>
+          </p:cNvSpPr>
+          <p:nvPr>
+            <p:ph type="sldImg"/>
+          </p:nvPr>
+        </p:nvSpPr>
+        <p:spPr/>
+      </p:sp>
+      <p:sp>
+        <p:nvSpPr>
+          <p:cNvPr id="3" name="Notes Placeholder 2"/>
+          <p:cNvSpPr>
+            <a:spLocks noGrp="1"/>
+          </p:cNvSpPr>
+          <p:nvPr>
+            <p:ph type="body" idx="1"/>
+          </p:nvPr>
+        </p:nvSpPr>
+        <p:spPr/>
+        <p:txBody>
+          <a:bodyPr/>
+          <a:lstStyle/>
+          <a:p>
+            <a:endParaRPr lang="en-GB" dirty="0"/>
+          </a:p>
+        </p:txBody>
+      </p:sp>
+      <p:sp>
+        <p:nvSpPr>
+          <p:cNvPr id="4" name="Slide Number Placeholder 3"/>
+          <p:cNvSpPr>
+            <a:spLocks noGrp="1"/>
+          </p:cNvSpPr>
+          <p:nvPr>
+            <p:ph type="sldNum" sz="quarter" idx="5"/>
+          </p:nvPr>
+        </p:nvSpPr>
+        <p:spPr/>
+        <p:txBody>
+          <a:bodyPr/>
+          <a:lstStyle/>
+          <a:p>
+            <a:fld id="{570CADB5-E544-48EA-AB0B-798B2BA47965}" type="slidenum">
+              <a:rPr lang="en-GB" smtClean="0"/>
+              <a:t>38</a:t>
+            </a:fld>
+            <a:endParaRPr lang="en-GB"/>
+          </a:p>
+        </p:txBody>
+      </p:sp>
+    </p:spTree>
+    <p:extLst>
+      <p:ext uri="{BB962C8B-B14F-4D97-AF65-F5344CB8AC3E}">
+        <p14:creationId xmlns:p14="http://schemas.microsoft.com/office/powerpoint/2010/main" val="348413236"/>
       </p:ext>
     </p:extLst>
   </p:cSld>
@@ -1223,7 +1332,7 @@
           <a:p>
             <a:fld id="{0C51D215-A4CB-49DC-B1FA-3E4C817F2B91}" type="datetimeFigureOut">
               <a:rPr lang="en-GB" smtClean="0"/>
-              <a:t>11/10/2021</a:t>
+              <a:t>18/10/2021</a:t>
             </a:fld>
             <a:endParaRPr lang="en-GB"/>
           </a:p>
@@ -1423,7 +1532,7 @@
           <a:p>
             <a:fld id="{0C51D215-A4CB-49DC-B1FA-3E4C817F2B91}" type="datetimeFigureOut">
               <a:rPr lang="en-GB" smtClean="0"/>
-              <a:t>11/10/2021</a:t>
+              <a:t>18/10/2021</a:t>
             </a:fld>
             <a:endParaRPr lang="en-GB"/>
           </a:p>
@@ -1633,7 +1742,7 @@
           <a:p>
             <a:fld id="{0C51D215-A4CB-49DC-B1FA-3E4C817F2B91}" type="datetimeFigureOut">
               <a:rPr lang="en-GB" smtClean="0"/>
-              <a:t>11/10/2021</a:t>
+              <a:t>18/10/2021</a:t>
             </a:fld>
             <a:endParaRPr lang="en-GB"/>
           </a:p>
@@ -1911,7 +2020,7 @@
           <a:p>
             <a:fld id="{0C51D215-A4CB-49DC-B1FA-3E4C817F2B91}" type="datetimeFigureOut">
               <a:rPr lang="en-GB" smtClean="0"/>
-              <a:t>11/10/2021</a:t>
+              <a:t>18/10/2021</a:t>
             </a:fld>
             <a:endParaRPr lang="en-GB"/>
           </a:p>
@@ -2187,7 +2296,7 @@
           <a:p>
             <a:fld id="{0C51D215-A4CB-49DC-B1FA-3E4C817F2B91}" type="datetimeFigureOut">
               <a:rPr lang="en-GB" smtClean="0"/>
-              <a:t>11/10/2021</a:t>
+              <a:t>18/10/2021</a:t>
             </a:fld>
             <a:endParaRPr lang="en-GB"/>
           </a:p>
@@ -2455,7 +2564,7 @@
           <a:p>
             <a:fld id="{0C51D215-A4CB-49DC-B1FA-3E4C817F2B91}" type="datetimeFigureOut">
               <a:rPr lang="en-GB" smtClean="0"/>
-              <a:t>11/10/2021</a:t>
+              <a:t>18/10/2021</a:t>
             </a:fld>
             <a:endParaRPr lang="en-GB"/>
           </a:p>
@@ -2870,7 +2979,7 @@
           <a:p>
             <a:fld id="{0C51D215-A4CB-49DC-B1FA-3E4C817F2B91}" type="datetimeFigureOut">
               <a:rPr lang="en-GB" smtClean="0"/>
-              <a:t>11/10/2021</a:t>
+              <a:t>18/10/2021</a:t>
             </a:fld>
             <a:endParaRPr lang="en-GB"/>
           </a:p>
@@ -3012,7 +3121,7 @@
           <a:p>
             <a:fld id="{0C51D215-A4CB-49DC-B1FA-3E4C817F2B91}" type="datetimeFigureOut">
               <a:rPr lang="en-GB" smtClean="0"/>
-              <a:t>11/10/2021</a:t>
+              <a:t>18/10/2021</a:t>
             </a:fld>
             <a:endParaRPr lang="en-GB"/>
           </a:p>
@@ -3125,7 +3234,7 @@
           <a:p>
             <a:fld id="{0C51D215-A4CB-49DC-B1FA-3E4C817F2B91}" type="datetimeFigureOut">
               <a:rPr lang="en-GB" smtClean="0"/>
-              <a:t>11/10/2021</a:t>
+              <a:t>18/10/2021</a:t>
             </a:fld>
             <a:endParaRPr lang="en-GB"/>
           </a:p>
@@ -3438,7 +3547,7 @@
           <a:p>
             <a:fld id="{0C51D215-A4CB-49DC-B1FA-3E4C817F2B91}" type="datetimeFigureOut">
               <a:rPr lang="en-GB" smtClean="0"/>
-              <a:t>11/10/2021</a:t>
+              <a:t>18/10/2021</a:t>
             </a:fld>
             <a:endParaRPr lang="en-GB"/>
           </a:p>
@@ -3727,7 +3836,7 @@
           <a:p>
             <a:fld id="{0C51D215-A4CB-49DC-B1FA-3E4C817F2B91}" type="datetimeFigureOut">
               <a:rPr lang="en-GB" smtClean="0"/>
-              <a:t>11/10/2021</a:t>
+              <a:t>18/10/2021</a:t>
             </a:fld>
             <a:endParaRPr lang="en-GB"/>
           </a:p>
@@ -3970,7 +4079,7 @@
           <a:p>
             <a:fld id="{0C51D215-A4CB-49DC-B1FA-3E4C817F2B91}" type="datetimeFigureOut">
               <a:rPr lang="en-GB" smtClean="0"/>
-              <a:t>11/10/2021</a:t>
+              <a:t>18/10/2021</a:t>
             </a:fld>
             <a:endParaRPr lang="en-GB"/>
           </a:p>
@@ -6695,7 +6804,7 @@
           <p:cNvPr id="2" name="Title 1">
             <a:extLst>
               <a:ext uri="{FF2B5EF4-FFF2-40B4-BE49-F238E27FC236}">
-                <a16:creationId xmlns:a16="http://schemas.microsoft.com/office/drawing/2014/main" id="{36C6852C-8E3C-4B57-A596-1BB7C4900700}"/>
+                <a16:creationId xmlns:a16="http://schemas.microsoft.com/office/drawing/2014/main" id="{52741A15-161D-48E6-824E-99C6FC1D509E}"/>
               </a:ext>
             </a:extLst>
           </p:cNvPr>
@@ -6703,49 +6812,7 @@
             <a:spLocks noGrp="1"/>
           </p:cNvSpPr>
           <p:nvPr>
-            <p:ph type="ctrTitle"/>
-          </p:nvPr>
-        </p:nvSpPr>
-        <p:spPr>
-          <a:xfrm>
-            <a:off x="1524000" y="1016210"/>
-            <a:ext cx="9144000" cy="1655762"/>
-          </a:xfrm>
-        </p:spPr>
-        <p:txBody>
-          <a:bodyPr>
-            <a:normAutofit fontScale="90000"/>
-          </a:bodyPr>
-          <a:lstStyle/>
-          <a:p>
-            <a:r>
-              <a:rPr lang="en-GB" dirty="0"/>
-              <a:t>Microsoft Power BI training</a:t>
-            </a:r>
-            <a:br>
-              <a:rPr lang="en-GB" dirty="0"/>
-            </a:br>
-            <a:r>
-              <a:rPr lang="en-GB" dirty="0"/>
-              <a:t>Week 2</a:t>
-            </a:r>
-          </a:p>
-        </p:txBody>
-      </p:sp>
-      <p:sp>
-        <p:nvSpPr>
-          <p:cNvPr id="3" name="Subtitle 2">
-            <a:extLst>
-              <a:ext uri="{FF2B5EF4-FFF2-40B4-BE49-F238E27FC236}">
-                <a16:creationId xmlns:a16="http://schemas.microsoft.com/office/drawing/2014/main" id="{400E41FA-8244-4945-973F-022497D7ED6E}"/>
-              </a:ext>
-            </a:extLst>
-          </p:cNvPr>
-          <p:cNvSpPr>
-            <a:spLocks noGrp="1"/>
-          </p:cNvSpPr>
-          <p:nvPr>
-            <p:ph type="subTitle" idx="1"/>
+            <p:ph type="title"/>
           </p:nvPr>
         </p:nvSpPr>
         <p:spPr/>
@@ -6755,151 +6822,15 @@
           <a:p>
             <a:r>
               <a:rPr lang="en-GB" dirty="0"/>
-              <a:t>The </a:t>
-            </a:r>
-            <a:r>
-              <a:rPr lang="en-GB" dirty="0" err="1"/>
-              <a:t>LandMark</a:t>
-            </a:r>
-            <a:r>
-              <a:rPr lang="en-GB" dirty="0"/>
-              <a:t>, School Lane, Burnley. BB11 1UF</a:t>
-            </a:r>
-          </a:p>
-          <a:p>
-            <a:r>
-              <a:rPr lang="en-GB" dirty="0"/>
-              <a:t>Monday 18</a:t>
-            </a:r>
-            <a:r>
-              <a:rPr lang="en-GB" baseline="30000" dirty="0"/>
-              <a:t>th</a:t>
-            </a:r>
-            <a:r>
-              <a:rPr lang="en-GB" dirty="0"/>
-              <a:t> October 17:30 – 18:30</a:t>
-            </a:r>
-          </a:p>
-          <a:p>
-            <a:r>
-              <a:rPr lang="en-GB" dirty="0"/>
-              <a:t>www.landmarkburnley.co.uk</a:t>
-            </a:r>
-          </a:p>
-        </p:txBody>
-      </p:sp>
-      <p:pic>
-        <p:nvPicPr>
-          <p:cNvPr id="4" name="Content Placeholder 4">
-            <a:extLst>
-              <a:ext uri="{FF2B5EF4-FFF2-40B4-BE49-F238E27FC236}">
-                <a16:creationId xmlns:a16="http://schemas.microsoft.com/office/drawing/2014/main" id="{7077F2C3-BC57-4754-A4DB-DB64DDC1F8F9}"/>
-              </a:ext>
-            </a:extLst>
-          </p:cNvPr>
-          <p:cNvPicPr>
-            <a:picLocks noChangeAspect="1"/>
-          </p:cNvPicPr>
-          <p:nvPr/>
-        </p:nvPicPr>
-        <p:blipFill>
-          <a:blip r:embed="rId3">
-            <a:extLst>
-              <a:ext uri="{28A0092B-C50C-407E-A947-70E740481C1C}">
-                <a14:useLocalDpi xmlns:a14="http://schemas.microsoft.com/office/drawing/2010/main" val="0"/>
-              </a:ext>
-            </a:extLst>
-          </a:blip>
-          <a:stretch>
-            <a:fillRect/>
-          </a:stretch>
-        </p:blipFill>
-        <p:spPr>
-          <a:xfrm>
-            <a:off x="9683527" y="5953125"/>
-            <a:ext cx="2383530" cy="786624"/>
-          </a:xfrm>
-          <a:prstGeom prst="rect">
-            <a:avLst/>
-          </a:prstGeom>
-        </p:spPr>
-      </p:pic>
-      <p:pic>
-        <p:nvPicPr>
-          <p:cNvPr id="6" name="Picture 5" descr="Text&#10;&#10;Description automatically generated">
-            <a:extLst>
-              <a:ext uri="{FF2B5EF4-FFF2-40B4-BE49-F238E27FC236}">
-                <a16:creationId xmlns:a16="http://schemas.microsoft.com/office/drawing/2014/main" id="{0B4A0D9C-62CD-4690-B79B-48239694ADA4}"/>
-              </a:ext>
-            </a:extLst>
-          </p:cNvPr>
-          <p:cNvPicPr>
-            <a:picLocks noChangeAspect="1"/>
-          </p:cNvPicPr>
-          <p:nvPr/>
-        </p:nvPicPr>
-        <p:blipFill>
-          <a:blip r:embed="rId4">
-            <a:extLst>
-              <a:ext uri="{28A0092B-C50C-407E-A947-70E740481C1C}">
-                <a14:useLocalDpi xmlns:a14="http://schemas.microsoft.com/office/drawing/2010/main" val="0"/>
-              </a:ext>
-            </a:extLst>
-          </a:blip>
-          <a:stretch>
-            <a:fillRect/>
-          </a:stretch>
-        </p:blipFill>
-        <p:spPr>
-          <a:xfrm>
-            <a:off x="297793" y="5166500"/>
-            <a:ext cx="3956967" cy="1968457"/>
-          </a:xfrm>
-          <a:prstGeom prst="rect">
-            <a:avLst/>
-          </a:prstGeom>
-        </p:spPr>
-      </p:pic>
-      <p:pic>
-        <p:nvPicPr>
-          <p:cNvPr id="7" name="Picture 6">
-            <a:extLst>
-              <a:ext uri="{FF2B5EF4-FFF2-40B4-BE49-F238E27FC236}">
-                <a16:creationId xmlns:a16="http://schemas.microsoft.com/office/drawing/2014/main" id="{26640956-4441-47A0-9A17-7DE21B82124F}"/>
-              </a:ext>
-            </a:extLst>
-          </p:cNvPr>
-          <p:cNvPicPr>
-            <a:picLocks noChangeAspect="1"/>
-          </p:cNvPicPr>
-          <p:nvPr/>
-        </p:nvPicPr>
-        <p:blipFill>
-          <a:blip r:embed="rId5">
-            <a:extLst>
-              <a:ext uri="{28A0092B-C50C-407E-A947-70E740481C1C}">
-                <a14:useLocalDpi xmlns:a14="http://schemas.microsoft.com/office/drawing/2010/main" val="0"/>
-              </a:ext>
-            </a:extLst>
-          </a:blip>
-          <a:stretch>
-            <a:fillRect/>
-          </a:stretch>
-        </p:blipFill>
-        <p:spPr>
-          <a:xfrm>
-            <a:off x="5603085" y="5349875"/>
-            <a:ext cx="1748578" cy="1288075"/>
-          </a:xfrm>
-          <a:prstGeom prst="rect">
-            <a:avLst/>
-          </a:prstGeom>
-        </p:spPr>
-      </p:pic>
+              <a:t>Blank – end of Lesson</a:t>
+            </a:r>
+          </a:p>
+        </p:txBody>
+      </p:sp>
     </p:spTree>
     <p:extLst>
       <p:ext uri="{BB962C8B-B14F-4D97-AF65-F5344CB8AC3E}">
-        <p14:creationId xmlns:p14="http://schemas.microsoft.com/office/powerpoint/2010/main" val="3211432376"/>
+        <p14:creationId xmlns:p14="http://schemas.microsoft.com/office/powerpoint/2010/main" val="1290072251"/>
       </p:ext>
     </p:extLst>
   </p:cSld>
@@ -6926,6 +6857,249 @@
           <a:chExt cx="0" cy="0"/>
         </a:xfrm>
       </p:grpSpPr>
+      <p:sp>
+        <p:nvSpPr>
+          <p:cNvPr id="2" name="Title 1">
+            <a:extLst>
+              <a:ext uri="{FF2B5EF4-FFF2-40B4-BE49-F238E27FC236}">
+                <a16:creationId xmlns:a16="http://schemas.microsoft.com/office/drawing/2014/main" id="{36C6852C-8E3C-4B57-A596-1BB7C4900700}"/>
+              </a:ext>
+            </a:extLst>
+          </p:cNvPr>
+          <p:cNvSpPr>
+            <a:spLocks noGrp="1"/>
+          </p:cNvSpPr>
+          <p:nvPr>
+            <p:ph type="ctrTitle"/>
+          </p:nvPr>
+        </p:nvSpPr>
+        <p:spPr>
+          <a:xfrm>
+            <a:off x="1524000" y="1016210"/>
+            <a:ext cx="9144000" cy="2239752"/>
+          </a:xfrm>
+        </p:spPr>
+        <p:txBody>
+          <a:bodyPr>
+            <a:normAutofit fontScale="90000"/>
+          </a:bodyPr>
+          <a:lstStyle/>
+          <a:p>
+            <a:r>
+              <a:rPr lang="en-GB" dirty="0"/>
+              <a:t>Microsoft Power BI training</a:t>
+            </a:r>
+            <a:br>
+              <a:rPr lang="en-GB" dirty="0"/>
+            </a:br>
+            <a:r>
+              <a:rPr lang="en-GB" dirty="0"/>
+              <a:t>Week 2</a:t>
+            </a:r>
+            <a:br>
+              <a:rPr lang="en-GB" dirty="0"/>
+            </a:br>
+            <a:r>
+              <a:rPr lang="en-GB" dirty="0"/>
+              <a:t>Power BI for Data Analyst</a:t>
+            </a:r>
+          </a:p>
+        </p:txBody>
+      </p:sp>
+      <p:sp>
+        <p:nvSpPr>
+          <p:cNvPr id="3" name="Subtitle 2">
+            <a:extLst>
+              <a:ext uri="{FF2B5EF4-FFF2-40B4-BE49-F238E27FC236}">
+                <a16:creationId xmlns:a16="http://schemas.microsoft.com/office/drawing/2014/main" id="{400E41FA-8244-4945-973F-022497D7ED6E}"/>
+              </a:ext>
+            </a:extLst>
+          </p:cNvPr>
+          <p:cNvSpPr>
+            <a:spLocks noGrp="1"/>
+          </p:cNvSpPr>
+          <p:nvPr>
+            <p:ph type="subTitle" idx="1"/>
+          </p:nvPr>
+        </p:nvSpPr>
+        <p:spPr/>
+        <p:txBody>
+          <a:bodyPr/>
+          <a:lstStyle/>
+          <a:p>
+            <a:r>
+              <a:rPr lang="en-GB" dirty="0"/>
+              <a:t>The </a:t>
+            </a:r>
+            <a:r>
+              <a:rPr lang="en-GB" dirty="0" err="1"/>
+              <a:t>LandMark</a:t>
+            </a:r>
+            <a:r>
+              <a:rPr lang="en-GB" dirty="0"/>
+              <a:t>, School Lane, Burnley. BB11 1UF</a:t>
+            </a:r>
+          </a:p>
+          <a:p>
+            <a:r>
+              <a:rPr lang="en-GB" dirty="0"/>
+              <a:t>Monday 18</a:t>
+            </a:r>
+            <a:r>
+              <a:rPr lang="en-GB" baseline="30000" dirty="0"/>
+              <a:t>th</a:t>
+            </a:r>
+            <a:r>
+              <a:rPr lang="en-GB" dirty="0"/>
+              <a:t> October 17:00 – 18:30</a:t>
+            </a:r>
+          </a:p>
+          <a:p>
+            <a:r>
+              <a:rPr lang="en-GB" dirty="0"/>
+              <a:t>www.landmarkburnley.co.uk</a:t>
+            </a:r>
+          </a:p>
+        </p:txBody>
+      </p:sp>
+      <p:pic>
+        <p:nvPicPr>
+          <p:cNvPr id="4" name="Content Placeholder 4">
+            <a:extLst>
+              <a:ext uri="{FF2B5EF4-FFF2-40B4-BE49-F238E27FC236}">
+                <a16:creationId xmlns:a16="http://schemas.microsoft.com/office/drawing/2014/main" id="{7077F2C3-BC57-4754-A4DB-DB64DDC1F8F9}"/>
+              </a:ext>
+            </a:extLst>
+          </p:cNvPr>
+          <p:cNvPicPr>
+            <a:picLocks noChangeAspect="1"/>
+          </p:cNvPicPr>
+          <p:nvPr/>
+        </p:nvPicPr>
+        <p:blipFill>
+          <a:blip r:embed="rId3">
+            <a:extLst>
+              <a:ext uri="{28A0092B-C50C-407E-A947-70E740481C1C}">
+                <a14:useLocalDpi xmlns:a14="http://schemas.microsoft.com/office/drawing/2010/main" val="0"/>
+              </a:ext>
+            </a:extLst>
+          </a:blip>
+          <a:stretch>
+            <a:fillRect/>
+          </a:stretch>
+        </p:blipFill>
+        <p:spPr>
+          <a:xfrm>
+            <a:off x="9683527" y="5953125"/>
+            <a:ext cx="2383530" cy="786624"/>
+          </a:xfrm>
+          <a:prstGeom prst="rect">
+            <a:avLst/>
+          </a:prstGeom>
+        </p:spPr>
+      </p:pic>
+      <p:pic>
+        <p:nvPicPr>
+          <p:cNvPr id="6" name="Picture 5" descr="Text&#10;&#10;Description automatically generated">
+            <a:extLst>
+              <a:ext uri="{FF2B5EF4-FFF2-40B4-BE49-F238E27FC236}">
+                <a16:creationId xmlns:a16="http://schemas.microsoft.com/office/drawing/2014/main" id="{0B4A0D9C-62CD-4690-B79B-48239694ADA4}"/>
+              </a:ext>
+            </a:extLst>
+          </p:cNvPr>
+          <p:cNvPicPr>
+            <a:picLocks noChangeAspect="1"/>
+          </p:cNvPicPr>
+          <p:nvPr/>
+        </p:nvPicPr>
+        <p:blipFill>
+          <a:blip r:embed="rId4">
+            <a:extLst>
+              <a:ext uri="{28A0092B-C50C-407E-A947-70E740481C1C}">
+                <a14:useLocalDpi xmlns:a14="http://schemas.microsoft.com/office/drawing/2010/main" val="0"/>
+              </a:ext>
+            </a:extLst>
+          </a:blip>
+          <a:stretch>
+            <a:fillRect/>
+          </a:stretch>
+        </p:blipFill>
+        <p:spPr>
+          <a:xfrm>
+            <a:off x="297793" y="5166500"/>
+            <a:ext cx="3956967" cy="1968457"/>
+          </a:xfrm>
+          <a:prstGeom prst="rect">
+            <a:avLst/>
+          </a:prstGeom>
+        </p:spPr>
+      </p:pic>
+      <p:pic>
+        <p:nvPicPr>
+          <p:cNvPr id="7" name="Picture 6">
+            <a:extLst>
+              <a:ext uri="{FF2B5EF4-FFF2-40B4-BE49-F238E27FC236}">
+                <a16:creationId xmlns:a16="http://schemas.microsoft.com/office/drawing/2014/main" id="{26640956-4441-47A0-9A17-7DE21B82124F}"/>
+              </a:ext>
+            </a:extLst>
+          </p:cNvPr>
+          <p:cNvPicPr>
+            <a:picLocks noChangeAspect="1"/>
+          </p:cNvPicPr>
+          <p:nvPr/>
+        </p:nvPicPr>
+        <p:blipFill>
+          <a:blip r:embed="rId5">
+            <a:extLst>
+              <a:ext uri="{28A0092B-C50C-407E-A947-70E740481C1C}">
+                <a14:useLocalDpi xmlns:a14="http://schemas.microsoft.com/office/drawing/2010/main" val="0"/>
+              </a:ext>
+            </a:extLst>
+          </a:blip>
+          <a:stretch>
+            <a:fillRect/>
+          </a:stretch>
+        </p:blipFill>
+        <p:spPr>
+          <a:xfrm>
+            <a:off x="5603085" y="5349875"/>
+            <a:ext cx="1748578" cy="1288075"/>
+          </a:xfrm>
+          <a:prstGeom prst="rect">
+            <a:avLst/>
+          </a:prstGeom>
+        </p:spPr>
+      </p:pic>
+    </p:spTree>
+    <p:extLst>
+      <p:ext uri="{BB962C8B-B14F-4D97-AF65-F5344CB8AC3E}">
+        <p14:creationId xmlns:p14="http://schemas.microsoft.com/office/powerpoint/2010/main" val="3211432376"/>
+      </p:ext>
+    </p:extLst>
+  </p:cSld>
+  <p:clrMapOvr>
+    <a:masterClrMapping/>
+  </p:clrMapOvr>
+</p:sld>
+</file>
+
+<file path=ppt/slides/slide25.xml><?xml version="1.0" encoding="utf-8"?>
+<p:sld xmlns:a="http://schemas.openxmlformats.org/drawingml/2006/main" xmlns:r="http://schemas.openxmlformats.org/officeDocument/2006/relationships" xmlns:p="http://schemas.openxmlformats.org/presentationml/2006/main">
+  <p:cSld>
+    <p:spTree>
+      <p:nvGrpSpPr>
+        <p:cNvPr id="1" name=""/>
+        <p:cNvGrpSpPr/>
+        <p:nvPr/>
+      </p:nvGrpSpPr>
+      <p:grpSpPr>
+        <a:xfrm>
+          <a:off x="0" y="0"/>
+          <a:ext cx="0" cy="0"/>
+          <a:chOff x="0" y="0"/>
+          <a:chExt cx="0" cy="0"/>
+        </a:xfrm>
+      </p:grpSpPr>
       <p:pic>
         <p:nvPicPr>
           <p:cNvPr id="3" name="Picture 2">
@@ -7052,6 +7226,737 @@
     <p:extLst>
       <p:ext uri="{BB962C8B-B14F-4D97-AF65-F5344CB8AC3E}">
         <p14:creationId xmlns:p14="http://schemas.microsoft.com/office/powerpoint/2010/main" val="3533555028"/>
+      </p:ext>
+    </p:extLst>
+  </p:cSld>
+  <p:clrMapOvr>
+    <a:masterClrMapping/>
+  </p:clrMapOvr>
+</p:sld>
+</file>
+
+<file path=ppt/slides/slide26.xml><?xml version="1.0" encoding="utf-8"?>
+<p:sld xmlns:a="http://schemas.openxmlformats.org/drawingml/2006/main" xmlns:r="http://schemas.openxmlformats.org/officeDocument/2006/relationships" xmlns:p="http://schemas.openxmlformats.org/presentationml/2006/main">
+  <p:cSld>
+    <p:spTree>
+      <p:nvGrpSpPr>
+        <p:cNvPr id="1" name=""/>
+        <p:cNvGrpSpPr/>
+        <p:nvPr/>
+      </p:nvGrpSpPr>
+      <p:grpSpPr>
+        <a:xfrm>
+          <a:off x="0" y="0"/>
+          <a:ext cx="0" cy="0"/>
+          <a:chOff x="0" y="0"/>
+          <a:chExt cx="0" cy="0"/>
+        </a:xfrm>
+      </p:grpSpPr>
+      <p:pic>
+        <p:nvPicPr>
+          <p:cNvPr id="3" name="Picture 2">
+            <a:extLst>
+              <a:ext uri="{FF2B5EF4-FFF2-40B4-BE49-F238E27FC236}">
+                <a16:creationId xmlns:a16="http://schemas.microsoft.com/office/drawing/2014/main" id="{1B832C01-2D8F-4173-A7CF-2A3982581D3C}"/>
+              </a:ext>
+            </a:extLst>
+          </p:cNvPr>
+          <p:cNvPicPr>
+            <a:picLocks noChangeAspect="1"/>
+          </p:cNvPicPr>
+          <p:nvPr/>
+        </p:nvPicPr>
+        <p:blipFill>
+          <a:blip r:embed="rId2"/>
+          <a:stretch>
+            <a:fillRect/>
+          </a:stretch>
+        </p:blipFill>
+        <p:spPr>
+          <a:xfrm>
+            <a:off x="0" y="7322"/>
+            <a:ext cx="12192000" cy="6843356"/>
+          </a:xfrm>
+          <a:prstGeom prst="rect">
+            <a:avLst/>
+          </a:prstGeom>
+        </p:spPr>
+      </p:pic>
+      <p:pic>
+        <p:nvPicPr>
+          <p:cNvPr id="4" name="Content Placeholder 4">
+            <a:extLst>
+              <a:ext uri="{FF2B5EF4-FFF2-40B4-BE49-F238E27FC236}">
+                <a16:creationId xmlns:a16="http://schemas.microsoft.com/office/drawing/2014/main" id="{90EF3F57-5C35-4ECC-A8A6-3A5C3571D9C8}"/>
+              </a:ext>
+            </a:extLst>
+          </p:cNvPr>
+          <p:cNvPicPr>
+            <a:picLocks noChangeAspect="1"/>
+          </p:cNvPicPr>
+          <p:nvPr/>
+        </p:nvPicPr>
+        <p:blipFill>
+          <a:blip r:embed="rId3">
+            <a:extLst>
+              <a:ext uri="{28A0092B-C50C-407E-A947-70E740481C1C}">
+                <a14:useLocalDpi xmlns:a14="http://schemas.microsoft.com/office/drawing/2010/main" val="0"/>
+              </a:ext>
+            </a:extLst>
+          </a:blip>
+          <a:stretch>
+            <a:fillRect/>
+          </a:stretch>
+        </p:blipFill>
+        <p:spPr>
+          <a:xfrm>
+            <a:off x="10217020" y="55983"/>
+            <a:ext cx="1956318" cy="578310"/>
+          </a:xfrm>
+          <a:prstGeom prst="rect">
+            <a:avLst/>
+          </a:prstGeom>
+        </p:spPr>
+      </p:pic>
+      <p:pic>
+        <p:nvPicPr>
+          <p:cNvPr id="6" name="Picture 5">
+            <a:extLst>
+              <a:ext uri="{FF2B5EF4-FFF2-40B4-BE49-F238E27FC236}">
+                <a16:creationId xmlns:a16="http://schemas.microsoft.com/office/drawing/2014/main" id="{019948C2-1A1E-4D0D-94BE-3E2760E99392}"/>
+              </a:ext>
+            </a:extLst>
+          </p:cNvPr>
+          <p:cNvPicPr>
+            <a:picLocks noChangeAspect="1"/>
+          </p:cNvPicPr>
+          <p:nvPr/>
+        </p:nvPicPr>
+        <p:blipFill>
+          <a:blip r:embed="rId4"/>
+          <a:stretch>
+            <a:fillRect/>
+          </a:stretch>
+        </p:blipFill>
+        <p:spPr>
+          <a:xfrm>
+            <a:off x="133350" y="92725"/>
+            <a:ext cx="7517752" cy="504825"/>
+          </a:xfrm>
+          <a:prstGeom prst="rect">
+            <a:avLst/>
+          </a:prstGeom>
+        </p:spPr>
+      </p:pic>
+    </p:spTree>
+    <p:extLst>
+      <p:ext uri="{BB962C8B-B14F-4D97-AF65-F5344CB8AC3E}">
+        <p14:creationId xmlns:p14="http://schemas.microsoft.com/office/powerpoint/2010/main" val="4134215860"/>
+      </p:ext>
+    </p:extLst>
+  </p:cSld>
+  <p:clrMapOvr>
+    <a:masterClrMapping/>
+  </p:clrMapOvr>
+</p:sld>
+</file>
+
+<file path=ppt/slides/slide27.xml><?xml version="1.0" encoding="utf-8"?>
+<p:sld xmlns:a="http://schemas.openxmlformats.org/drawingml/2006/main" xmlns:r="http://schemas.openxmlformats.org/officeDocument/2006/relationships" xmlns:p="http://schemas.openxmlformats.org/presentationml/2006/main">
+  <p:cSld>
+    <p:spTree>
+      <p:nvGrpSpPr>
+        <p:cNvPr id="1" name=""/>
+        <p:cNvGrpSpPr/>
+        <p:nvPr/>
+      </p:nvGrpSpPr>
+      <p:grpSpPr>
+        <a:xfrm>
+          <a:off x="0" y="0"/>
+          <a:ext cx="0" cy="0"/>
+          <a:chOff x="0" y="0"/>
+          <a:chExt cx="0" cy="0"/>
+        </a:xfrm>
+      </p:grpSpPr>
+      <p:sp>
+        <p:nvSpPr>
+          <p:cNvPr id="2" name="Title 1">
+            <a:extLst>
+              <a:ext uri="{FF2B5EF4-FFF2-40B4-BE49-F238E27FC236}">
+                <a16:creationId xmlns:a16="http://schemas.microsoft.com/office/drawing/2014/main" id="{EB411E83-E42A-42B6-BD7D-C5FA24565652}"/>
+              </a:ext>
+            </a:extLst>
+          </p:cNvPr>
+          <p:cNvSpPr>
+            <a:spLocks noGrp="1"/>
+          </p:cNvSpPr>
+          <p:nvPr>
+            <p:ph type="title"/>
+          </p:nvPr>
+        </p:nvSpPr>
+        <p:spPr>
+          <a:xfrm>
+            <a:off x="838200" y="112158"/>
+            <a:ext cx="10515600" cy="735706"/>
+          </a:xfrm>
+        </p:spPr>
+        <p:txBody>
+          <a:bodyPr/>
+          <a:lstStyle/>
+          <a:p>
+            <a:r>
+              <a:rPr lang="en-GB" dirty="0"/>
+              <a:t>PBI Desktop, PBI Service, PBI Mobile apps</a:t>
+            </a:r>
+          </a:p>
+        </p:txBody>
+      </p:sp>
+      <p:pic>
+        <p:nvPicPr>
+          <p:cNvPr id="5" name="Picture 4">
+            <a:extLst>
+              <a:ext uri="{FF2B5EF4-FFF2-40B4-BE49-F238E27FC236}">
+                <a16:creationId xmlns:a16="http://schemas.microsoft.com/office/drawing/2014/main" id="{535A30B2-59D6-44B3-A5E5-2211DA072E22}"/>
+              </a:ext>
+            </a:extLst>
+          </p:cNvPr>
+          <p:cNvPicPr>
+            <a:picLocks noChangeAspect="1"/>
+          </p:cNvPicPr>
+          <p:nvPr/>
+        </p:nvPicPr>
+        <p:blipFill>
+          <a:blip r:embed="rId2">
+            <a:extLst>
+              <a:ext uri="{28A0092B-C50C-407E-A947-70E740481C1C}">
+                <a14:useLocalDpi xmlns:a14="http://schemas.microsoft.com/office/drawing/2010/main" val="0"/>
+              </a:ext>
+            </a:extLst>
+          </a:blip>
+          <a:stretch>
+            <a:fillRect/>
+          </a:stretch>
+        </p:blipFill>
+        <p:spPr>
+          <a:xfrm>
+            <a:off x="-1" y="727223"/>
+            <a:ext cx="11061577" cy="6018620"/>
+          </a:xfrm>
+          <a:prstGeom prst="rect">
+            <a:avLst/>
+          </a:prstGeom>
+        </p:spPr>
+      </p:pic>
+      <p:pic>
+        <p:nvPicPr>
+          <p:cNvPr id="4" name="Content Placeholder 4">
+            <a:extLst>
+              <a:ext uri="{FF2B5EF4-FFF2-40B4-BE49-F238E27FC236}">
+                <a16:creationId xmlns:a16="http://schemas.microsoft.com/office/drawing/2014/main" id="{96783690-B936-4A3D-AEC5-D7F361D37A85}"/>
+              </a:ext>
+            </a:extLst>
+          </p:cNvPr>
+          <p:cNvPicPr>
+            <a:picLocks noChangeAspect="1"/>
+          </p:cNvPicPr>
+          <p:nvPr/>
+        </p:nvPicPr>
+        <p:blipFill>
+          <a:blip r:embed="rId3">
+            <a:extLst>
+              <a:ext uri="{28A0092B-C50C-407E-A947-70E740481C1C}">
+                <a14:useLocalDpi xmlns:a14="http://schemas.microsoft.com/office/drawing/2010/main" val="0"/>
+              </a:ext>
+            </a:extLst>
+          </a:blip>
+          <a:stretch>
+            <a:fillRect/>
+          </a:stretch>
+        </p:blipFill>
+        <p:spPr>
+          <a:xfrm>
+            <a:off x="9683527" y="5953125"/>
+            <a:ext cx="2383530" cy="786624"/>
+          </a:xfrm>
+          <a:prstGeom prst="rect">
+            <a:avLst/>
+          </a:prstGeom>
+        </p:spPr>
+      </p:pic>
+    </p:spTree>
+    <p:extLst>
+      <p:ext uri="{BB962C8B-B14F-4D97-AF65-F5344CB8AC3E}">
+        <p14:creationId xmlns:p14="http://schemas.microsoft.com/office/powerpoint/2010/main" val="4177514275"/>
+      </p:ext>
+    </p:extLst>
+  </p:cSld>
+  <p:clrMapOvr>
+    <a:masterClrMapping/>
+  </p:clrMapOvr>
+</p:sld>
+</file>
+
+<file path=ppt/slides/slide28.xml><?xml version="1.0" encoding="utf-8"?>
+<p:sld xmlns:a="http://schemas.openxmlformats.org/drawingml/2006/main" xmlns:r="http://schemas.openxmlformats.org/officeDocument/2006/relationships" xmlns:p="http://schemas.openxmlformats.org/presentationml/2006/main">
+  <p:cSld>
+    <p:spTree>
+      <p:nvGrpSpPr>
+        <p:cNvPr id="1" name=""/>
+        <p:cNvGrpSpPr/>
+        <p:nvPr/>
+      </p:nvGrpSpPr>
+      <p:grpSpPr>
+        <a:xfrm>
+          <a:off x="0" y="0"/>
+          <a:ext cx="0" cy="0"/>
+          <a:chOff x="0" y="0"/>
+          <a:chExt cx="0" cy="0"/>
+        </a:xfrm>
+      </p:grpSpPr>
+      <p:sp>
+        <p:nvSpPr>
+          <p:cNvPr id="3" name="Content Placeholder 2">
+            <a:extLst>
+              <a:ext uri="{FF2B5EF4-FFF2-40B4-BE49-F238E27FC236}">
+                <a16:creationId xmlns:a16="http://schemas.microsoft.com/office/drawing/2014/main" id="{40963E1F-A60C-4F59-9E1F-8008ED3E9CA9}"/>
+              </a:ext>
+            </a:extLst>
+          </p:cNvPr>
+          <p:cNvSpPr>
+            <a:spLocks noGrp="1"/>
+          </p:cNvSpPr>
+          <p:nvPr>
+            <p:ph idx="1"/>
+          </p:nvPr>
+        </p:nvSpPr>
+        <p:spPr>
+          <a:xfrm>
+            <a:off x="1051264" y="1028724"/>
+            <a:ext cx="10515600" cy="4216083"/>
+          </a:xfrm>
+        </p:spPr>
+        <p:txBody>
+          <a:bodyPr>
+            <a:normAutofit/>
+          </a:bodyPr>
+          <a:lstStyle/>
+          <a:p>
+            <a:r>
+              <a:rPr lang="en-GB" dirty="0"/>
+              <a:t>Open blog </a:t>
+            </a:r>
+            <a:r>
+              <a:rPr lang="en-GB" dirty="0">
+                <a:hlinkClick r:id="rId2"/>
+              </a:rPr>
+              <a:t>https://docs.microsoft.com/en-us/power-bi/create-reports/desktop-excel-stunning-report</a:t>
+            </a:r>
+            <a:endParaRPr lang="en-GB" dirty="0"/>
+          </a:p>
+          <a:p>
+            <a:r>
+              <a:rPr lang="en-GB" dirty="0"/>
+              <a:t>Demo a step</a:t>
+            </a:r>
+          </a:p>
+          <a:p>
+            <a:r>
+              <a:rPr lang="en-GB" dirty="0"/>
+              <a:t>Show finished report</a:t>
+            </a:r>
+          </a:p>
+          <a:p>
+            <a:r>
+              <a:rPr lang="en-GB" dirty="0"/>
+              <a:t>Save Power BI desktop report as .</a:t>
+            </a:r>
+            <a:r>
+              <a:rPr lang="en-GB" dirty="0" err="1"/>
+              <a:t>pbix</a:t>
+            </a:r>
+            <a:r>
+              <a:rPr lang="en-GB" dirty="0"/>
+              <a:t> locally</a:t>
+            </a:r>
+          </a:p>
+          <a:p>
+            <a:r>
+              <a:rPr lang="en-GB" dirty="0"/>
+              <a:t>Conrad demo</a:t>
+            </a:r>
+          </a:p>
+        </p:txBody>
+      </p:sp>
+      <p:sp>
+        <p:nvSpPr>
+          <p:cNvPr id="4" name="TextBox 3">
+            <a:extLst>
+              <a:ext uri="{FF2B5EF4-FFF2-40B4-BE49-F238E27FC236}">
+                <a16:creationId xmlns:a16="http://schemas.microsoft.com/office/drawing/2014/main" id="{0D009318-34ED-49EB-AE04-BFB438B5A519}"/>
+              </a:ext>
+            </a:extLst>
+          </p:cNvPr>
+          <p:cNvSpPr txBox="1"/>
+          <p:nvPr/>
+        </p:nvSpPr>
+        <p:spPr>
+          <a:xfrm>
+            <a:off x="1051264" y="233661"/>
+            <a:ext cx="10515600" cy="461665"/>
+          </a:xfrm>
+          <a:prstGeom prst="rect">
+            <a:avLst/>
+          </a:prstGeom>
+          <a:solidFill>
+            <a:schemeClr val="tx1">
+              <a:lumMod val="65000"/>
+              <a:lumOff val="35000"/>
+            </a:schemeClr>
+          </a:solidFill>
+        </p:spPr>
+        <p:txBody>
+          <a:bodyPr wrap="square" rtlCol="0">
+            <a:spAutoFit/>
+          </a:bodyPr>
+          <a:lstStyle/>
+          <a:p>
+            <a:pPr algn="ctr"/>
+            <a:r>
+              <a:rPr lang="en-GB" sz="2400" dirty="0">
+                <a:solidFill>
+                  <a:schemeClr val="bg1"/>
+                </a:solidFill>
+              </a:rPr>
+              <a:t>Complete Power BI report from Lesson 1</a:t>
+            </a:r>
+          </a:p>
+        </p:txBody>
+      </p:sp>
+      <p:pic>
+        <p:nvPicPr>
+          <p:cNvPr id="5" name="Content Placeholder 4">
+            <a:extLst>
+              <a:ext uri="{FF2B5EF4-FFF2-40B4-BE49-F238E27FC236}">
+                <a16:creationId xmlns:a16="http://schemas.microsoft.com/office/drawing/2014/main" id="{4269D105-DF79-4155-8D48-871BC7889B59}"/>
+              </a:ext>
+            </a:extLst>
+          </p:cNvPr>
+          <p:cNvPicPr>
+            <a:picLocks noChangeAspect="1"/>
+          </p:cNvPicPr>
+          <p:nvPr/>
+        </p:nvPicPr>
+        <p:blipFill>
+          <a:blip r:embed="rId3">
+            <a:extLst>
+              <a:ext uri="{28A0092B-C50C-407E-A947-70E740481C1C}">
+                <a14:useLocalDpi xmlns:a14="http://schemas.microsoft.com/office/drawing/2010/main" val="0"/>
+              </a:ext>
+            </a:extLst>
+          </a:blip>
+          <a:stretch>
+            <a:fillRect/>
+          </a:stretch>
+        </p:blipFill>
+        <p:spPr>
+          <a:xfrm>
+            <a:off x="82327" y="5972175"/>
+            <a:ext cx="2383530" cy="786624"/>
+          </a:xfrm>
+          <a:prstGeom prst="rect">
+            <a:avLst/>
+          </a:prstGeom>
+        </p:spPr>
+      </p:pic>
+      <p:pic>
+        <p:nvPicPr>
+          <p:cNvPr id="6" name="Picture 5">
+            <a:extLst>
+              <a:ext uri="{FF2B5EF4-FFF2-40B4-BE49-F238E27FC236}">
+                <a16:creationId xmlns:a16="http://schemas.microsoft.com/office/drawing/2014/main" id="{77E21BCD-2643-40A4-9FE8-17A7F6971774}"/>
+              </a:ext>
+            </a:extLst>
+          </p:cNvPr>
+          <p:cNvPicPr>
+            <a:picLocks noChangeAspect="1"/>
+          </p:cNvPicPr>
+          <p:nvPr/>
+        </p:nvPicPr>
+        <p:blipFill>
+          <a:blip r:embed="rId4"/>
+          <a:stretch>
+            <a:fillRect/>
+          </a:stretch>
+        </p:blipFill>
+        <p:spPr>
+          <a:xfrm>
+            <a:off x="5134939" y="3429000"/>
+            <a:ext cx="6045530" cy="3429000"/>
+          </a:xfrm>
+          <a:prstGeom prst="rect">
+            <a:avLst/>
+          </a:prstGeom>
+        </p:spPr>
+      </p:pic>
+    </p:spTree>
+    <p:extLst>
+      <p:ext uri="{BB962C8B-B14F-4D97-AF65-F5344CB8AC3E}">
+        <p14:creationId xmlns:p14="http://schemas.microsoft.com/office/powerpoint/2010/main" val="1490125902"/>
+      </p:ext>
+    </p:extLst>
+  </p:cSld>
+  <p:clrMapOvr>
+    <a:masterClrMapping/>
+  </p:clrMapOvr>
+</p:sld>
+</file>
+
+<file path=ppt/slides/slide29.xml><?xml version="1.0" encoding="utf-8"?>
+<p:sld xmlns:a="http://schemas.openxmlformats.org/drawingml/2006/main" xmlns:r="http://schemas.openxmlformats.org/officeDocument/2006/relationships" xmlns:p="http://schemas.openxmlformats.org/presentationml/2006/main">
+  <p:cSld>
+    <p:spTree>
+      <p:nvGrpSpPr>
+        <p:cNvPr id="1" name=""/>
+        <p:cNvGrpSpPr/>
+        <p:nvPr/>
+      </p:nvGrpSpPr>
+      <p:grpSpPr>
+        <a:xfrm>
+          <a:off x="0" y="0"/>
+          <a:ext cx="0" cy="0"/>
+          <a:chOff x="0" y="0"/>
+          <a:chExt cx="0" cy="0"/>
+        </a:xfrm>
+      </p:grpSpPr>
+      <p:sp>
+        <p:nvSpPr>
+          <p:cNvPr id="3" name="Content Placeholder 2">
+            <a:extLst>
+              <a:ext uri="{FF2B5EF4-FFF2-40B4-BE49-F238E27FC236}">
+                <a16:creationId xmlns:a16="http://schemas.microsoft.com/office/drawing/2014/main" id="{40963E1F-A60C-4F59-9E1F-8008ED3E9CA9}"/>
+              </a:ext>
+            </a:extLst>
+          </p:cNvPr>
+          <p:cNvSpPr>
+            <a:spLocks noGrp="1"/>
+          </p:cNvSpPr>
+          <p:nvPr>
+            <p:ph idx="1"/>
+          </p:nvPr>
+        </p:nvSpPr>
+        <p:spPr>
+          <a:xfrm>
+            <a:off x="838200" y="1960880"/>
+            <a:ext cx="10515600" cy="4216083"/>
+          </a:xfrm>
+        </p:spPr>
+        <p:txBody>
+          <a:bodyPr>
+            <a:normAutofit/>
+          </a:bodyPr>
+          <a:lstStyle/>
+          <a:p>
+            <a:r>
+              <a:rPr lang="en-GB" dirty="0"/>
+              <a:t>Back to get &amp; prepare data with Power Query Editor</a:t>
+            </a:r>
+          </a:p>
+          <a:p>
+            <a:r>
+              <a:rPr lang="en-GB" dirty="0"/>
+              <a:t>From Power BI Desktop open Power Query Editor...how ?</a:t>
+            </a:r>
+          </a:p>
+          <a:p>
+            <a:r>
+              <a:rPr lang="en-GB" dirty="0"/>
+              <a:t>Show PQE features</a:t>
+            </a:r>
+          </a:p>
+          <a:p>
+            <a:r>
+              <a:rPr lang="en-GB" dirty="0"/>
+              <a:t>Power Query Language = M</a:t>
+            </a:r>
+          </a:p>
+          <a:p>
+            <a:r>
+              <a:rPr lang="en-GB" dirty="0"/>
+              <a:t>BTW it’s the same in Excel </a:t>
+            </a:r>
+          </a:p>
+          <a:p>
+            <a:r>
+              <a:rPr lang="en-GB" dirty="0"/>
+              <a:t>Get data &amp; transform as demo in Learn</a:t>
+            </a:r>
+          </a:p>
+        </p:txBody>
+      </p:sp>
+      <p:sp>
+        <p:nvSpPr>
+          <p:cNvPr id="4" name="TextBox 3">
+            <a:extLst>
+              <a:ext uri="{FF2B5EF4-FFF2-40B4-BE49-F238E27FC236}">
+                <a16:creationId xmlns:a16="http://schemas.microsoft.com/office/drawing/2014/main" id="{0D009318-34ED-49EB-AE04-BFB438B5A519}"/>
+              </a:ext>
+            </a:extLst>
+          </p:cNvPr>
+          <p:cNvSpPr txBox="1"/>
+          <p:nvPr/>
+        </p:nvSpPr>
+        <p:spPr>
+          <a:xfrm>
+            <a:off x="1051264" y="233661"/>
+            <a:ext cx="10515600" cy="1077218"/>
+          </a:xfrm>
+          <a:prstGeom prst="rect">
+            <a:avLst/>
+          </a:prstGeom>
+          <a:solidFill>
+            <a:schemeClr val="tx1">
+              <a:lumMod val="65000"/>
+              <a:lumOff val="35000"/>
+            </a:schemeClr>
+          </a:solidFill>
+        </p:spPr>
+        <p:txBody>
+          <a:bodyPr wrap="square" rtlCol="0">
+            <a:spAutoFit/>
+          </a:bodyPr>
+          <a:lstStyle/>
+          <a:p>
+            <a:pPr algn="ctr"/>
+            <a:r>
+              <a:rPr lang="en-GB" sz="4000" dirty="0">
+                <a:solidFill>
+                  <a:schemeClr val="bg1"/>
+                </a:solidFill>
+              </a:rPr>
+              <a:t>Power BI </a:t>
+            </a:r>
+            <a:r>
+              <a:rPr lang="en-GB" sz="3600" dirty="0">
+                <a:solidFill>
+                  <a:schemeClr val="bg1"/>
+                </a:solidFill>
+              </a:rPr>
+              <a:t>Week 2</a:t>
+            </a:r>
+          </a:p>
+          <a:p>
+            <a:pPr algn="ctr"/>
+            <a:r>
+              <a:rPr lang="en-GB" sz="2400" dirty="0">
+                <a:solidFill>
+                  <a:schemeClr val="bg1"/>
+                </a:solidFill>
+              </a:rPr>
+              <a:t>Use Power Query Editor to get data &amp; prepare your data </a:t>
+            </a:r>
+          </a:p>
+        </p:txBody>
+      </p:sp>
+      <p:pic>
+        <p:nvPicPr>
+          <p:cNvPr id="5" name="Content Placeholder 4">
+            <a:extLst>
+              <a:ext uri="{FF2B5EF4-FFF2-40B4-BE49-F238E27FC236}">
+                <a16:creationId xmlns:a16="http://schemas.microsoft.com/office/drawing/2014/main" id="{4269D105-DF79-4155-8D48-871BC7889B59}"/>
+              </a:ext>
+            </a:extLst>
+          </p:cNvPr>
+          <p:cNvPicPr>
+            <a:picLocks noChangeAspect="1"/>
+          </p:cNvPicPr>
+          <p:nvPr/>
+        </p:nvPicPr>
+        <p:blipFill>
+          <a:blip r:embed="rId2">
+            <a:extLst>
+              <a:ext uri="{28A0092B-C50C-407E-A947-70E740481C1C}">
+                <a14:useLocalDpi xmlns:a14="http://schemas.microsoft.com/office/drawing/2010/main" val="0"/>
+              </a:ext>
+            </a:extLst>
+          </a:blip>
+          <a:stretch>
+            <a:fillRect/>
+          </a:stretch>
+        </p:blipFill>
+        <p:spPr>
+          <a:xfrm>
+            <a:off x="140031" y="5949069"/>
+            <a:ext cx="2383530" cy="786624"/>
+          </a:xfrm>
+          <a:prstGeom prst="rect">
+            <a:avLst/>
+          </a:prstGeom>
+        </p:spPr>
+      </p:pic>
+      <p:pic>
+        <p:nvPicPr>
+          <p:cNvPr id="8" name="Picture 7">
+            <a:extLst>
+              <a:ext uri="{FF2B5EF4-FFF2-40B4-BE49-F238E27FC236}">
+                <a16:creationId xmlns:a16="http://schemas.microsoft.com/office/drawing/2014/main" id="{697ABB16-D471-46AD-BD58-19810EDF16A9}"/>
+              </a:ext>
+            </a:extLst>
+          </p:cNvPr>
+          <p:cNvPicPr>
+            <a:picLocks noChangeAspect="1"/>
+          </p:cNvPicPr>
+          <p:nvPr/>
+        </p:nvPicPr>
+        <p:blipFill>
+          <a:blip r:embed="rId3"/>
+          <a:stretch>
+            <a:fillRect/>
+          </a:stretch>
+        </p:blipFill>
+        <p:spPr>
+          <a:xfrm>
+            <a:off x="9481579" y="1795462"/>
+            <a:ext cx="2228850" cy="1762125"/>
+          </a:xfrm>
+          <a:prstGeom prst="rect">
+            <a:avLst/>
+          </a:prstGeom>
+        </p:spPr>
+      </p:pic>
+      <p:pic>
+        <p:nvPicPr>
+          <p:cNvPr id="6" name="Picture 5">
+            <a:extLst>
+              <a:ext uri="{FF2B5EF4-FFF2-40B4-BE49-F238E27FC236}">
+                <a16:creationId xmlns:a16="http://schemas.microsoft.com/office/drawing/2014/main" id="{C0C9CACF-A062-4C0F-B124-E6C29F7F7270}"/>
+              </a:ext>
+            </a:extLst>
+          </p:cNvPr>
+          <p:cNvPicPr>
+            <a:picLocks noChangeAspect="1"/>
+          </p:cNvPicPr>
+          <p:nvPr/>
+        </p:nvPicPr>
+        <p:blipFill>
+          <a:blip r:embed="rId4"/>
+          <a:stretch>
+            <a:fillRect/>
+          </a:stretch>
+        </p:blipFill>
+        <p:spPr>
+          <a:xfrm>
+            <a:off x="6686328" y="4687410"/>
+            <a:ext cx="5505671" cy="2204878"/>
+          </a:xfrm>
+          <a:prstGeom prst="rect">
+            <a:avLst/>
+          </a:prstGeom>
+        </p:spPr>
+      </p:pic>
+    </p:spTree>
+    <p:extLst>
+      <p:ext uri="{BB962C8B-B14F-4D97-AF65-F5344CB8AC3E}">
+        <p14:creationId xmlns:p14="http://schemas.microsoft.com/office/powerpoint/2010/main" val="3995989675"/>
       </p:ext>
     </p:extLst>
   </p:cSld>
@@ -7302,6 +8207,2084 @@
     <p:extLst>
       <p:ext uri="{BB962C8B-B14F-4D97-AF65-F5344CB8AC3E}">
         <p14:creationId xmlns:p14="http://schemas.microsoft.com/office/powerpoint/2010/main" val="1218901886"/>
+      </p:ext>
+    </p:extLst>
+  </p:cSld>
+  <p:clrMapOvr>
+    <a:masterClrMapping/>
+  </p:clrMapOvr>
+</p:sld>
+</file>
+
+<file path=ppt/slides/slide30.xml><?xml version="1.0" encoding="utf-8"?>
+<p:sld xmlns:a="http://schemas.openxmlformats.org/drawingml/2006/main" xmlns:r="http://schemas.openxmlformats.org/officeDocument/2006/relationships" xmlns:p="http://schemas.openxmlformats.org/presentationml/2006/main">
+  <p:cSld>
+    <p:spTree>
+      <p:nvGrpSpPr>
+        <p:cNvPr id="1" name=""/>
+        <p:cNvGrpSpPr/>
+        <p:nvPr/>
+      </p:nvGrpSpPr>
+      <p:grpSpPr>
+        <a:xfrm>
+          <a:off x="0" y="0"/>
+          <a:ext cx="0" cy="0"/>
+          <a:chOff x="0" y="0"/>
+          <a:chExt cx="0" cy="0"/>
+        </a:xfrm>
+      </p:grpSpPr>
+      <p:sp>
+        <p:nvSpPr>
+          <p:cNvPr id="3" name="Content Placeholder 2">
+            <a:extLst>
+              <a:ext uri="{FF2B5EF4-FFF2-40B4-BE49-F238E27FC236}">
+                <a16:creationId xmlns:a16="http://schemas.microsoft.com/office/drawing/2014/main" id="{40963E1F-A60C-4F59-9E1F-8008ED3E9CA9}"/>
+              </a:ext>
+            </a:extLst>
+          </p:cNvPr>
+          <p:cNvSpPr>
+            <a:spLocks noGrp="1"/>
+          </p:cNvSpPr>
+          <p:nvPr>
+            <p:ph idx="1"/>
+          </p:nvPr>
+        </p:nvSpPr>
+        <p:spPr>
+          <a:xfrm>
+            <a:off x="838200" y="1427480"/>
+            <a:ext cx="10515600" cy="2104263"/>
+          </a:xfrm>
+        </p:spPr>
+        <p:txBody>
+          <a:bodyPr>
+            <a:normAutofit fontScale="77500" lnSpcReduction="20000"/>
+          </a:bodyPr>
+          <a:lstStyle/>
+          <a:p>
+            <a:r>
+              <a:rPr lang="en-GB" dirty="0"/>
+              <a:t>Csv &gt; raw ? See </a:t>
+            </a:r>
+            <a:r>
+              <a:rPr lang="en-GB" dirty="0" err="1"/>
+              <a:t>url</a:t>
+            </a:r>
+            <a:r>
+              <a:rPr lang="en-GB" dirty="0"/>
+              <a:t> : </a:t>
+            </a:r>
+            <a:r>
+              <a:rPr lang="en-GB" dirty="0">
+                <a:hlinkClick r:id="rId2"/>
+              </a:rPr>
+              <a:t>https://github.com/wottabyte/PBITraining/tree/master/10WeekPBIonline2021</a:t>
+            </a:r>
+            <a:endParaRPr lang="en-GB" dirty="0"/>
+          </a:p>
+          <a:p>
+            <a:r>
+              <a:rPr lang="en-GB" dirty="0"/>
+              <a:t>PQE use Web </a:t>
+            </a:r>
+          </a:p>
+          <a:p>
+            <a:r>
+              <a:rPr lang="en-GB" dirty="0"/>
+              <a:t>Lowercase then capitalize</a:t>
+            </a:r>
+          </a:p>
+          <a:p>
+            <a:r>
+              <a:rPr lang="en-GB" dirty="0"/>
+              <a:t>Pivot years</a:t>
+            </a:r>
+          </a:p>
+          <a:p>
+            <a:r>
+              <a:rPr lang="en-GB" dirty="0"/>
+              <a:t>Close &amp; Apply</a:t>
+            </a:r>
+          </a:p>
+          <a:p>
+            <a:pPr marL="0" indent="0">
+              <a:buNone/>
+            </a:pPr>
+            <a:endParaRPr lang="en-GB" dirty="0"/>
+          </a:p>
+        </p:txBody>
+      </p:sp>
+      <p:sp>
+        <p:nvSpPr>
+          <p:cNvPr id="4" name="TextBox 3">
+            <a:extLst>
+              <a:ext uri="{FF2B5EF4-FFF2-40B4-BE49-F238E27FC236}">
+                <a16:creationId xmlns:a16="http://schemas.microsoft.com/office/drawing/2014/main" id="{0D009318-34ED-49EB-AE04-BFB438B5A519}"/>
+              </a:ext>
+            </a:extLst>
+          </p:cNvPr>
+          <p:cNvSpPr txBox="1"/>
+          <p:nvPr/>
+        </p:nvSpPr>
+        <p:spPr>
+          <a:xfrm>
+            <a:off x="1051264" y="233661"/>
+            <a:ext cx="10515600" cy="1077218"/>
+          </a:xfrm>
+          <a:prstGeom prst="rect">
+            <a:avLst/>
+          </a:prstGeom>
+          <a:solidFill>
+            <a:schemeClr val="tx1">
+              <a:lumMod val="65000"/>
+              <a:lumOff val="35000"/>
+            </a:schemeClr>
+          </a:solidFill>
+        </p:spPr>
+        <p:txBody>
+          <a:bodyPr wrap="square" rtlCol="0">
+            <a:spAutoFit/>
+          </a:bodyPr>
+          <a:lstStyle/>
+          <a:p>
+            <a:pPr algn="ctr"/>
+            <a:r>
+              <a:rPr lang="en-GB" sz="4000" dirty="0">
+                <a:solidFill>
+                  <a:schemeClr val="bg1"/>
+                </a:solidFill>
+              </a:rPr>
+              <a:t>Power BI </a:t>
+            </a:r>
+            <a:r>
+              <a:rPr lang="en-GB" sz="3600" dirty="0">
+                <a:solidFill>
+                  <a:schemeClr val="bg1"/>
+                </a:solidFill>
+              </a:rPr>
+              <a:t>Week 2</a:t>
+            </a:r>
+          </a:p>
+          <a:p>
+            <a:pPr algn="ctr"/>
+            <a:r>
+              <a:rPr lang="en-GB" sz="2400" dirty="0">
+                <a:solidFill>
+                  <a:schemeClr val="bg1"/>
+                </a:solidFill>
+              </a:rPr>
+              <a:t>Power Query Editor: Capitalize &amp; </a:t>
+            </a:r>
+            <a:r>
+              <a:rPr lang="en-GB" sz="2400" dirty="0" err="1">
+                <a:solidFill>
+                  <a:schemeClr val="bg1"/>
+                </a:solidFill>
+              </a:rPr>
+              <a:t>UNpivot</a:t>
+            </a:r>
+            <a:r>
+              <a:rPr lang="en-GB" sz="2400" dirty="0">
+                <a:solidFill>
+                  <a:schemeClr val="bg1"/>
+                </a:solidFill>
+              </a:rPr>
+              <a:t> data demo</a:t>
+            </a:r>
+          </a:p>
+        </p:txBody>
+      </p:sp>
+      <p:pic>
+        <p:nvPicPr>
+          <p:cNvPr id="5" name="Content Placeholder 4">
+            <a:extLst>
+              <a:ext uri="{FF2B5EF4-FFF2-40B4-BE49-F238E27FC236}">
+                <a16:creationId xmlns:a16="http://schemas.microsoft.com/office/drawing/2014/main" id="{4269D105-DF79-4155-8D48-871BC7889B59}"/>
+              </a:ext>
+            </a:extLst>
+          </p:cNvPr>
+          <p:cNvPicPr>
+            <a:picLocks noChangeAspect="1"/>
+          </p:cNvPicPr>
+          <p:nvPr/>
+        </p:nvPicPr>
+        <p:blipFill>
+          <a:blip r:embed="rId3">
+            <a:extLst>
+              <a:ext uri="{28A0092B-C50C-407E-A947-70E740481C1C}">
+                <a14:useLocalDpi xmlns:a14="http://schemas.microsoft.com/office/drawing/2010/main" val="0"/>
+              </a:ext>
+            </a:extLst>
+          </a:blip>
+          <a:stretch>
+            <a:fillRect/>
+          </a:stretch>
+        </p:blipFill>
+        <p:spPr>
+          <a:xfrm>
+            <a:off x="9683527" y="5953125"/>
+            <a:ext cx="2383530" cy="786624"/>
+          </a:xfrm>
+          <a:prstGeom prst="rect">
+            <a:avLst/>
+          </a:prstGeom>
+        </p:spPr>
+      </p:pic>
+      <p:pic>
+        <p:nvPicPr>
+          <p:cNvPr id="7" name="Picture 6">
+            <a:extLst>
+              <a:ext uri="{FF2B5EF4-FFF2-40B4-BE49-F238E27FC236}">
+                <a16:creationId xmlns:a16="http://schemas.microsoft.com/office/drawing/2014/main" id="{A481333E-9249-4E36-B9BE-A3650CEE3E7E}"/>
+              </a:ext>
+            </a:extLst>
+          </p:cNvPr>
+          <p:cNvPicPr>
+            <a:picLocks noChangeAspect="1"/>
+          </p:cNvPicPr>
+          <p:nvPr/>
+        </p:nvPicPr>
+        <p:blipFill>
+          <a:blip r:embed="rId4"/>
+          <a:stretch>
+            <a:fillRect/>
+          </a:stretch>
+        </p:blipFill>
+        <p:spPr>
+          <a:xfrm>
+            <a:off x="1051264" y="3530244"/>
+            <a:ext cx="9459690" cy="2424381"/>
+          </a:xfrm>
+          <a:prstGeom prst="rect">
+            <a:avLst/>
+          </a:prstGeom>
+        </p:spPr>
+      </p:pic>
+    </p:spTree>
+    <p:extLst>
+      <p:ext uri="{BB962C8B-B14F-4D97-AF65-F5344CB8AC3E}">
+        <p14:creationId xmlns:p14="http://schemas.microsoft.com/office/powerpoint/2010/main" val="4005933731"/>
+      </p:ext>
+    </p:extLst>
+  </p:cSld>
+  <p:clrMapOvr>
+    <a:masterClrMapping/>
+  </p:clrMapOvr>
+</p:sld>
+</file>
+
+<file path=ppt/slides/slide31.xml><?xml version="1.0" encoding="utf-8"?>
+<p:sld xmlns:a="http://schemas.openxmlformats.org/drawingml/2006/main" xmlns:r="http://schemas.openxmlformats.org/officeDocument/2006/relationships" xmlns:p="http://schemas.openxmlformats.org/presentationml/2006/main">
+  <p:cSld>
+    <p:spTree>
+      <p:nvGrpSpPr>
+        <p:cNvPr id="1" name=""/>
+        <p:cNvGrpSpPr/>
+        <p:nvPr/>
+      </p:nvGrpSpPr>
+      <p:grpSpPr>
+        <a:xfrm>
+          <a:off x="0" y="0"/>
+          <a:ext cx="0" cy="0"/>
+          <a:chOff x="0" y="0"/>
+          <a:chExt cx="0" cy="0"/>
+        </a:xfrm>
+      </p:grpSpPr>
+      <p:sp>
+        <p:nvSpPr>
+          <p:cNvPr id="2" name="Title 1">
+            <a:extLst>
+              <a:ext uri="{FF2B5EF4-FFF2-40B4-BE49-F238E27FC236}">
+                <a16:creationId xmlns:a16="http://schemas.microsoft.com/office/drawing/2014/main" id="{46D467DC-BD5C-468C-9F4E-40A6588AE1F3}"/>
+              </a:ext>
+            </a:extLst>
+          </p:cNvPr>
+          <p:cNvSpPr>
+            <a:spLocks noGrp="1"/>
+          </p:cNvSpPr>
+          <p:nvPr>
+            <p:ph type="title"/>
+          </p:nvPr>
+        </p:nvSpPr>
+        <p:spPr/>
+        <p:txBody>
+          <a:bodyPr/>
+          <a:lstStyle/>
+          <a:p>
+            <a:r>
+              <a:rPr lang="en-GB" dirty="0"/>
+              <a:t>Preparation for next week</a:t>
+            </a:r>
+          </a:p>
+        </p:txBody>
+      </p:sp>
+      <p:sp>
+        <p:nvSpPr>
+          <p:cNvPr id="3" name="Content Placeholder 2">
+            <a:extLst>
+              <a:ext uri="{FF2B5EF4-FFF2-40B4-BE49-F238E27FC236}">
+                <a16:creationId xmlns:a16="http://schemas.microsoft.com/office/drawing/2014/main" id="{52CED677-B6E6-4CE3-AB1E-E1EBC8A943F5}"/>
+              </a:ext>
+            </a:extLst>
+          </p:cNvPr>
+          <p:cNvSpPr>
+            <a:spLocks noGrp="1"/>
+          </p:cNvSpPr>
+          <p:nvPr>
+            <p:ph idx="1"/>
+          </p:nvPr>
+        </p:nvSpPr>
+        <p:spPr/>
+        <p:txBody>
+          <a:bodyPr/>
+          <a:lstStyle/>
+          <a:p>
+            <a:r>
+              <a:rPr lang="en-GB" dirty="0"/>
+              <a:t>Microsoft Learn : </a:t>
+            </a:r>
+            <a:r>
+              <a:rPr lang="en-GB" dirty="0">
+                <a:hlinkClick r:id="rId2"/>
+              </a:rPr>
+              <a:t>https://docs.microsoft.com/en-us/learn/certifications/exams/da-100</a:t>
+            </a:r>
+            <a:endParaRPr lang="en-GB" dirty="0"/>
+          </a:p>
+          <a:p>
+            <a:r>
+              <a:rPr lang="en-GB" dirty="0"/>
+              <a:t>Get started with MS data analytics </a:t>
+            </a:r>
+            <a:r>
+              <a:rPr lang="en-GB" dirty="0">
+                <a:hlinkClick r:id="rId3"/>
+              </a:rPr>
+              <a:t>https://docs.microsoft.com/en-us/learn/paths/data-analytics-microsoft/</a:t>
+            </a:r>
+            <a:endParaRPr lang="en-GB" dirty="0"/>
+          </a:p>
+          <a:p>
+            <a:endParaRPr lang="en-GB" dirty="0"/>
+          </a:p>
+          <a:p>
+            <a:endParaRPr lang="en-GB" dirty="0"/>
+          </a:p>
+          <a:p>
+            <a:endParaRPr lang="en-GB" dirty="0"/>
+          </a:p>
+          <a:p>
+            <a:r>
+              <a:rPr lang="en-GB" dirty="0"/>
+              <a:t>Microsoft documentation : </a:t>
+            </a:r>
+            <a:r>
+              <a:rPr lang="en-GB" dirty="0">
+                <a:hlinkClick r:id="rId4"/>
+              </a:rPr>
+              <a:t>https://docs.microsoft.com/en-us/power-bi/learning-catalog/</a:t>
+            </a:r>
+            <a:endParaRPr lang="en-GB" dirty="0"/>
+          </a:p>
+          <a:p>
+            <a:endParaRPr lang="en-GB" dirty="0"/>
+          </a:p>
+          <a:p>
+            <a:endParaRPr lang="en-GB" dirty="0"/>
+          </a:p>
+          <a:p>
+            <a:endParaRPr lang="en-GB" dirty="0"/>
+          </a:p>
+        </p:txBody>
+      </p:sp>
+      <p:pic>
+        <p:nvPicPr>
+          <p:cNvPr id="7" name="Picture 6">
+            <a:extLst>
+              <a:ext uri="{FF2B5EF4-FFF2-40B4-BE49-F238E27FC236}">
+                <a16:creationId xmlns:a16="http://schemas.microsoft.com/office/drawing/2014/main" id="{B1F404CD-6B77-4449-898F-A0EDB59F4C83}"/>
+              </a:ext>
+            </a:extLst>
+          </p:cNvPr>
+          <p:cNvPicPr>
+            <a:picLocks noChangeAspect="1"/>
+          </p:cNvPicPr>
+          <p:nvPr/>
+        </p:nvPicPr>
+        <p:blipFill>
+          <a:blip r:embed="rId5"/>
+          <a:stretch>
+            <a:fillRect/>
+          </a:stretch>
+        </p:blipFill>
+        <p:spPr>
+          <a:xfrm>
+            <a:off x="7162800" y="3181350"/>
+            <a:ext cx="4457700" cy="1866900"/>
+          </a:xfrm>
+          <a:prstGeom prst="rect">
+            <a:avLst/>
+          </a:prstGeom>
+        </p:spPr>
+      </p:pic>
+      <p:pic>
+        <p:nvPicPr>
+          <p:cNvPr id="8" name="Content Placeholder 4">
+            <a:extLst>
+              <a:ext uri="{FF2B5EF4-FFF2-40B4-BE49-F238E27FC236}">
+                <a16:creationId xmlns:a16="http://schemas.microsoft.com/office/drawing/2014/main" id="{D6C8343B-14F1-433E-996F-FD6CBC577605}"/>
+              </a:ext>
+            </a:extLst>
+          </p:cNvPr>
+          <p:cNvPicPr>
+            <a:picLocks noChangeAspect="1"/>
+          </p:cNvPicPr>
+          <p:nvPr/>
+        </p:nvPicPr>
+        <p:blipFill>
+          <a:blip r:embed="rId6">
+            <a:extLst>
+              <a:ext uri="{28A0092B-C50C-407E-A947-70E740481C1C}">
+                <a14:useLocalDpi xmlns:a14="http://schemas.microsoft.com/office/drawing/2010/main" val="0"/>
+              </a:ext>
+            </a:extLst>
+          </a:blip>
+          <a:stretch>
+            <a:fillRect/>
+          </a:stretch>
+        </p:blipFill>
+        <p:spPr>
+          <a:xfrm>
+            <a:off x="9683527" y="5953125"/>
+            <a:ext cx="2383530" cy="786624"/>
+          </a:xfrm>
+          <a:prstGeom prst="rect">
+            <a:avLst/>
+          </a:prstGeom>
+        </p:spPr>
+      </p:pic>
+    </p:spTree>
+    <p:extLst>
+      <p:ext uri="{BB962C8B-B14F-4D97-AF65-F5344CB8AC3E}">
+        <p14:creationId xmlns:p14="http://schemas.microsoft.com/office/powerpoint/2010/main" val="3783977165"/>
+      </p:ext>
+    </p:extLst>
+  </p:cSld>
+  <p:clrMapOvr>
+    <a:masterClrMapping/>
+  </p:clrMapOvr>
+</p:sld>
+</file>
+
+<file path=ppt/slides/slide32.xml><?xml version="1.0" encoding="utf-8"?>
+<p:sld xmlns:a="http://schemas.openxmlformats.org/drawingml/2006/main" xmlns:r="http://schemas.openxmlformats.org/officeDocument/2006/relationships" xmlns:p="http://schemas.openxmlformats.org/presentationml/2006/main">
+  <p:cSld>
+    <p:spTree>
+      <p:nvGrpSpPr>
+        <p:cNvPr id="1" name=""/>
+        <p:cNvGrpSpPr/>
+        <p:nvPr/>
+      </p:nvGrpSpPr>
+      <p:grpSpPr>
+        <a:xfrm>
+          <a:off x="0" y="0"/>
+          <a:ext cx="0" cy="0"/>
+          <a:chOff x="0" y="0"/>
+          <a:chExt cx="0" cy="0"/>
+        </a:xfrm>
+      </p:grpSpPr>
+      <p:sp>
+        <p:nvSpPr>
+          <p:cNvPr id="3" name="Content Placeholder 2">
+            <a:extLst>
+              <a:ext uri="{FF2B5EF4-FFF2-40B4-BE49-F238E27FC236}">
+                <a16:creationId xmlns:a16="http://schemas.microsoft.com/office/drawing/2014/main" id="{40963E1F-A60C-4F59-9E1F-8008ED3E9CA9}"/>
+              </a:ext>
+            </a:extLst>
+          </p:cNvPr>
+          <p:cNvSpPr>
+            <a:spLocks noGrp="1"/>
+          </p:cNvSpPr>
+          <p:nvPr>
+            <p:ph idx="1"/>
+          </p:nvPr>
+        </p:nvSpPr>
+        <p:spPr>
+          <a:xfrm>
+            <a:off x="838200" y="1960880"/>
+            <a:ext cx="10515600" cy="1263033"/>
+          </a:xfrm>
+        </p:spPr>
+        <p:txBody>
+          <a:bodyPr>
+            <a:normAutofit fontScale="62500" lnSpcReduction="20000"/>
+          </a:bodyPr>
+          <a:lstStyle/>
+          <a:p>
+            <a:r>
+              <a:rPr lang="en-GB" dirty="0"/>
+              <a:t>Microsoft Learn - Complete Learning Path ‘Prepare Data for analysis’</a:t>
+            </a:r>
+          </a:p>
+          <a:p>
+            <a:r>
+              <a:rPr lang="en-GB" dirty="0"/>
+              <a:t>Module – ‘Get data in Power BI</a:t>
+            </a:r>
+          </a:p>
+          <a:p>
+            <a:r>
+              <a:rPr lang="en-GB" dirty="0"/>
+              <a:t>Module – ‘Clean, transform and load data in Power BI</a:t>
+            </a:r>
+          </a:p>
+          <a:p>
+            <a:r>
+              <a:rPr lang="en-GB" dirty="0"/>
+              <a:t>Download the slides from GitHub</a:t>
+            </a:r>
+          </a:p>
+          <a:p>
+            <a:pPr marL="0" indent="0">
+              <a:buNone/>
+            </a:pPr>
+            <a:endParaRPr lang="en-GB" dirty="0"/>
+          </a:p>
+        </p:txBody>
+      </p:sp>
+      <p:sp>
+        <p:nvSpPr>
+          <p:cNvPr id="4" name="TextBox 3">
+            <a:extLst>
+              <a:ext uri="{FF2B5EF4-FFF2-40B4-BE49-F238E27FC236}">
+                <a16:creationId xmlns:a16="http://schemas.microsoft.com/office/drawing/2014/main" id="{0D009318-34ED-49EB-AE04-BFB438B5A519}"/>
+              </a:ext>
+            </a:extLst>
+          </p:cNvPr>
+          <p:cNvSpPr txBox="1"/>
+          <p:nvPr/>
+        </p:nvSpPr>
+        <p:spPr>
+          <a:xfrm>
+            <a:off x="1051264" y="233661"/>
+            <a:ext cx="10515600" cy="707886"/>
+          </a:xfrm>
+          <a:prstGeom prst="rect">
+            <a:avLst/>
+          </a:prstGeom>
+          <a:solidFill>
+            <a:schemeClr val="tx1">
+              <a:lumMod val="65000"/>
+              <a:lumOff val="35000"/>
+            </a:schemeClr>
+          </a:solidFill>
+        </p:spPr>
+        <p:txBody>
+          <a:bodyPr wrap="square" rtlCol="0">
+            <a:spAutoFit/>
+          </a:bodyPr>
+          <a:lstStyle/>
+          <a:p>
+            <a:pPr algn="ctr"/>
+            <a:r>
+              <a:rPr lang="en-GB" sz="4000" dirty="0">
+                <a:solidFill>
+                  <a:schemeClr val="bg1"/>
+                </a:solidFill>
+              </a:rPr>
+              <a:t>Power BI </a:t>
+            </a:r>
+            <a:r>
+              <a:rPr lang="en-GB" sz="3600" dirty="0">
+                <a:solidFill>
+                  <a:schemeClr val="bg1"/>
+                </a:solidFill>
+              </a:rPr>
+              <a:t>Week 2 </a:t>
+            </a:r>
+            <a:r>
+              <a:rPr lang="en-GB" sz="3600" dirty="0" err="1">
+                <a:solidFill>
+                  <a:schemeClr val="bg1"/>
+                </a:solidFill>
+              </a:rPr>
+              <a:t>CourseWork</a:t>
+            </a:r>
+            <a:endParaRPr lang="en-GB" sz="3600" dirty="0">
+              <a:solidFill>
+                <a:schemeClr val="bg1"/>
+              </a:solidFill>
+            </a:endParaRPr>
+          </a:p>
+        </p:txBody>
+      </p:sp>
+      <p:pic>
+        <p:nvPicPr>
+          <p:cNvPr id="5" name="Content Placeholder 4">
+            <a:extLst>
+              <a:ext uri="{FF2B5EF4-FFF2-40B4-BE49-F238E27FC236}">
+                <a16:creationId xmlns:a16="http://schemas.microsoft.com/office/drawing/2014/main" id="{4269D105-DF79-4155-8D48-871BC7889B59}"/>
+              </a:ext>
+            </a:extLst>
+          </p:cNvPr>
+          <p:cNvPicPr>
+            <a:picLocks noChangeAspect="1"/>
+          </p:cNvPicPr>
+          <p:nvPr/>
+        </p:nvPicPr>
+        <p:blipFill>
+          <a:blip r:embed="rId2">
+            <a:extLst>
+              <a:ext uri="{28A0092B-C50C-407E-A947-70E740481C1C}">
+                <a14:useLocalDpi xmlns:a14="http://schemas.microsoft.com/office/drawing/2010/main" val="0"/>
+              </a:ext>
+            </a:extLst>
+          </a:blip>
+          <a:stretch>
+            <a:fillRect/>
+          </a:stretch>
+        </p:blipFill>
+        <p:spPr>
+          <a:xfrm>
+            <a:off x="9683527" y="5953125"/>
+            <a:ext cx="2383530" cy="786624"/>
+          </a:xfrm>
+          <a:prstGeom prst="rect">
+            <a:avLst/>
+          </a:prstGeom>
+        </p:spPr>
+      </p:pic>
+      <p:pic>
+        <p:nvPicPr>
+          <p:cNvPr id="7" name="Picture 6">
+            <a:extLst>
+              <a:ext uri="{FF2B5EF4-FFF2-40B4-BE49-F238E27FC236}">
+                <a16:creationId xmlns:a16="http://schemas.microsoft.com/office/drawing/2014/main" id="{716EFCA6-EB56-4318-9501-46F6579FFF17}"/>
+              </a:ext>
+            </a:extLst>
+          </p:cNvPr>
+          <p:cNvPicPr>
+            <a:picLocks noChangeAspect="1"/>
+          </p:cNvPicPr>
+          <p:nvPr/>
+        </p:nvPicPr>
+        <p:blipFill>
+          <a:blip r:embed="rId3"/>
+          <a:stretch>
+            <a:fillRect/>
+          </a:stretch>
+        </p:blipFill>
+        <p:spPr>
+          <a:xfrm>
+            <a:off x="838200" y="3254789"/>
+            <a:ext cx="5067300" cy="1238250"/>
+          </a:xfrm>
+          <a:prstGeom prst="rect">
+            <a:avLst/>
+          </a:prstGeom>
+        </p:spPr>
+      </p:pic>
+      <p:pic>
+        <p:nvPicPr>
+          <p:cNvPr id="9" name="Picture 8">
+            <a:extLst>
+              <a:ext uri="{FF2B5EF4-FFF2-40B4-BE49-F238E27FC236}">
+                <a16:creationId xmlns:a16="http://schemas.microsoft.com/office/drawing/2014/main" id="{6536511B-60E4-4C64-AD6A-A3FBCB9B09DA}"/>
+              </a:ext>
+            </a:extLst>
+          </p:cNvPr>
+          <p:cNvPicPr>
+            <a:picLocks noChangeAspect="1"/>
+          </p:cNvPicPr>
+          <p:nvPr/>
+        </p:nvPicPr>
+        <p:blipFill>
+          <a:blip r:embed="rId4"/>
+          <a:stretch>
+            <a:fillRect/>
+          </a:stretch>
+        </p:blipFill>
+        <p:spPr>
+          <a:xfrm>
+            <a:off x="6198047" y="3487323"/>
+            <a:ext cx="4181475" cy="1057275"/>
+          </a:xfrm>
+          <a:prstGeom prst="rect">
+            <a:avLst/>
+          </a:prstGeom>
+        </p:spPr>
+      </p:pic>
+      <p:pic>
+        <p:nvPicPr>
+          <p:cNvPr id="11" name="Picture 10">
+            <a:extLst>
+              <a:ext uri="{FF2B5EF4-FFF2-40B4-BE49-F238E27FC236}">
+                <a16:creationId xmlns:a16="http://schemas.microsoft.com/office/drawing/2014/main" id="{8E001337-79A5-4581-B5BE-650CE29F1BBF}"/>
+              </a:ext>
+            </a:extLst>
+          </p:cNvPr>
+          <p:cNvPicPr>
+            <a:picLocks noChangeAspect="1"/>
+          </p:cNvPicPr>
+          <p:nvPr/>
+        </p:nvPicPr>
+        <p:blipFill>
+          <a:blip r:embed="rId5"/>
+          <a:stretch>
+            <a:fillRect/>
+          </a:stretch>
+        </p:blipFill>
+        <p:spPr>
+          <a:xfrm>
+            <a:off x="6309064" y="4681238"/>
+            <a:ext cx="4724400" cy="1076325"/>
+          </a:xfrm>
+          <a:prstGeom prst="rect">
+            <a:avLst/>
+          </a:prstGeom>
+        </p:spPr>
+      </p:pic>
+      <p:sp>
+        <p:nvSpPr>
+          <p:cNvPr id="12" name="TextBox 11">
+            <a:extLst>
+              <a:ext uri="{FF2B5EF4-FFF2-40B4-BE49-F238E27FC236}">
+                <a16:creationId xmlns:a16="http://schemas.microsoft.com/office/drawing/2014/main" id="{A0865804-B3A4-47A4-94FA-AE4F6432EFF7}"/>
+              </a:ext>
+            </a:extLst>
+          </p:cNvPr>
+          <p:cNvSpPr txBox="1"/>
+          <p:nvPr/>
+        </p:nvSpPr>
+        <p:spPr>
+          <a:xfrm>
+            <a:off x="1051264" y="6001923"/>
+            <a:ext cx="8332433" cy="400110"/>
+          </a:xfrm>
+          <a:prstGeom prst="rect">
+            <a:avLst/>
+          </a:prstGeom>
+          <a:noFill/>
+        </p:spPr>
+        <p:txBody>
+          <a:bodyPr wrap="square" rtlCol="0">
+            <a:spAutoFit/>
+          </a:bodyPr>
+          <a:lstStyle/>
+          <a:p>
+            <a:r>
+              <a:rPr lang="en-GB" sz="2000" dirty="0">
+                <a:hlinkClick r:id="rId6"/>
+              </a:rPr>
+              <a:t>https://docs.microsoft.com/en-us/learn/paths/prepare-data-power-bi/</a:t>
+            </a:r>
+            <a:endParaRPr lang="en-GB" sz="2000" dirty="0"/>
+          </a:p>
+        </p:txBody>
+      </p:sp>
+    </p:spTree>
+    <p:extLst>
+      <p:ext uri="{BB962C8B-B14F-4D97-AF65-F5344CB8AC3E}">
+        <p14:creationId xmlns:p14="http://schemas.microsoft.com/office/powerpoint/2010/main" val="3880536388"/>
+      </p:ext>
+    </p:extLst>
+  </p:cSld>
+  <p:clrMapOvr>
+    <a:masterClrMapping/>
+  </p:clrMapOvr>
+</p:sld>
+</file>
+
+<file path=ppt/slides/slide33.xml><?xml version="1.0" encoding="utf-8"?>
+<p:sld xmlns:a="http://schemas.openxmlformats.org/drawingml/2006/main" xmlns:r="http://schemas.openxmlformats.org/officeDocument/2006/relationships" xmlns:p="http://schemas.openxmlformats.org/presentationml/2006/main">
+  <p:cSld>
+    <p:spTree>
+      <p:nvGrpSpPr>
+        <p:cNvPr id="1" name=""/>
+        <p:cNvGrpSpPr/>
+        <p:nvPr/>
+      </p:nvGrpSpPr>
+      <p:grpSpPr>
+        <a:xfrm>
+          <a:off x="0" y="0"/>
+          <a:ext cx="0" cy="0"/>
+          <a:chOff x="0" y="0"/>
+          <a:chExt cx="0" cy="0"/>
+        </a:xfrm>
+      </p:grpSpPr>
+      <p:sp>
+        <p:nvSpPr>
+          <p:cNvPr id="3" name="Content Placeholder 2">
+            <a:extLst>
+              <a:ext uri="{FF2B5EF4-FFF2-40B4-BE49-F238E27FC236}">
+                <a16:creationId xmlns:a16="http://schemas.microsoft.com/office/drawing/2014/main" id="{40963E1F-A60C-4F59-9E1F-8008ED3E9CA9}"/>
+              </a:ext>
+            </a:extLst>
+          </p:cNvPr>
+          <p:cNvSpPr>
+            <a:spLocks noGrp="1"/>
+          </p:cNvSpPr>
+          <p:nvPr>
+            <p:ph idx="1"/>
+          </p:nvPr>
+        </p:nvSpPr>
+        <p:spPr>
+          <a:xfrm>
+            <a:off x="1051264" y="1665263"/>
+            <a:ext cx="10515600" cy="2684796"/>
+          </a:xfrm>
+        </p:spPr>
+        <p:txBody>
+          <a:bodyPr>
+            <a:normAutofit lnSpcReduction="10000"/>
+          </a:bodyPr>
+          <a:lstStyle/>
+          <a:p>
+            <a:r>
+              <a:rPr lang="en-GB" dirty="0" err="1"/>
+              <a:t>Goto</a:t>
+            </a:r>
+            <a:r>
+              <a:rPr lang="en-GB" dirty="0"/>
+              <a:t> </a:t>
+            </a:r>
+            <a:r>
+              <a:rPr lang="en-GB" dirty="0">
+                <a:hlinkClick r:id="rId2"/>
+              </a:rPr>
+              <a:t>www.powerbi.com</a:t>
+            </a:r>
+            <a:r>
+              <a:rPr lang="en-GB" dirty="0"/>
+              <a:t> and click ‘Sign in’. Free license.</a:t>
+            </a:r>
+          </a:p>
+          <a:p>
+            <a:r>
+              <a:rPr lang="en-GB" dirty="0"/>
+              <a:t>Work or school a/c ? If none then create a Microsoft a/c but cannot use a </a:t>
+            </a:r>
+            <a:r>
+              <a:rPr lang="en-GB" dirty="0" err="1"/>
+              <a:t>gmail</a:t>
+            </a:r>
+            <a:r>
+              <a:rPr lang="en-GB" dirty="0"/>
+              <a:t>. </a:t>
+            </a:r>
+            <a:r>
+              <a:rPr lang="en-GB" dirty="0">
+                <a:hlinkClick r:id="rId3"/>
+              </a:rPr>
+              <a:t>https://docs.microsoft.com/en-us/power-bi/consumer/end-user-sign-in</a:t>
+            </a:r>
+            <a:endParaRPr lang="en-GB" dirty="0"/>
+          </a:p>
+          <a:p>
+            <a:r>
+              <a:rPr lang="en-GB" dirty="0"/>
+              <a:t>If fails we can help you during the workshop later this eve.</a:t>
+            </a:r>
+          </a:p>
+          <a:p>
+            <a:r>
+              <a:rPr lang="en-GB" dirty="0"/>
+              <a:t>Show Power BI Service Home page My workspace is blank.</a:t>
+            </a:r>
+          </a:p>
+        </p:txBody>
+      </p:sp>
+      <p:sp>
+        <p:nvSpPr>
+          <p:cNvPr id="4" name="TextBox 3">
+            <a:extLst>
+              <a:ext uri="{FF2B5EF4-FFF2-40B4-BE49-F238E27FC236}">
+                <a16:creationId xmlns:a16="http://schemas.microsoft.com/office/drawing/2014/main" id="{0D009318-34ED-49EB-AE04-BFB438B5A519}"/>
+              </a:ext>
+            </a:extLst>
+          </p:cNvPr>
+          <p:cNvSpPr txBox="1"/>
+          <p:nvPr/>
+        </p:nvSpPr>
+        <p:spPr>
+          <a:xfrm>
+            <a:off x="1051264" y="233661"/>
+            <a:ext cx="10515600" cy="830997"/>
+          </a:xfrm>
+          <a:prstGeom prst="rect">
+            <a:avLst/>
+          </a:prstGeom>
+          <a:solidFill>
+            <a:schemeClr val="tx1">
+              <a:lumMod val="65000"/>
+              <a:lumOff val="35000"/>
+            </a:schemeClr>
+          </a:solidFill>
+        </p:spPr>
+        <p:txBody>
+          <a:bodyPr wrap="square" rtlCol="0">
+            <a:spAutoFit/>
+          </a:bodyPr>
+          <a:lstStyle/>
+          <a:p>
+            <a:pPr algn="ctr"/>
+            <a:r>
+              <a:rPr lang="en-GB" sz="2400" dirty="0">
+                <a:solidFill>
+                  <a:schemeClr val="bg1"/>
+                </a:solidFill>
+              </a:rPr>
+              <a:t>Create a Power BI Service account</a:t>
+            </a:r>
+          </a:p>
+          <a:p>
+            <a:pPr algn="ctr"/>
+            <a:r>
+              <a:rPr lang="en-GB" sz="2400" dirty="0">
+                <a:solidFill>
+                  <a:schemeClr val="bg1"/>
+                </a:solidFill>
+              </a:rPr>
+              <a:t>Sign up &amp; login with Power BI account (needs a Microsoft a/c)</a:t>
+            </a:r>
+          </a:p>
+        </p:txBody>
+      </p:sp>
+      <p:pic>
+        <p:nvPicPr>
+          <p:cNvPr id="5" name="Content Placeholder 4">
+            <a:extLst>
+              <a:ext uri="{FF2B5EF4-FFF2-40B4-BE49-F238E27FC236}">
+                <a16:creationId xmlns:a16="http://schemas.microsoft.com/office/drawing/2014/main" id="{4269D105-DF79-4155-8D48-871BC7889B59}"/>
+              </a:ext>
+            </a:extLst>
+          </p:cNvPr>
+          <p:cNvPicPr>
+            <a:picLocks noChangeAspect="1"/>
+          </p:cNvPicPr>
+          <p:nvPr/>
+        </p:nvPicPr>
+        <p:blipFill>
+          <a:blip r:embed="rId4">
+            <a:extLst>
+              <a:ext uri="{28A0092B-C50C-407E-A947-70E740481C1C}">
+                <a14:useLocalDpi xmlns:a14="http://schemas.microsoft.com/office/drawing/2010/main" val="0"/>
+              </a:ext>
+            </a:extLst>
+          </a:blip>
+          <a:stretch>
+            <a:fillRect/>
+          </a:stretch>
+        </p:blipFill>
+        <p:spPr>
+          <a:xfrm>
+            <a:off x="9275070" y="5840127"/>
+            <a:ext cx="2383530" cy="786624"/>
+          </a:xfrm>
+          <a:prstGeom prst="rect">
+            <a:avLst/>
+          </a:prstGeom>
+        </p:spPr>
+      </p:pic>
+      <p:pic>
+        <p:nvPicPr>
+          <p:cNvPr id="6" name="Picture 5">
+            <a:extLst>
+              <a:ext uri="{FF2B5EF4-FFF2-40B4-BE49-F238E27FC236}">
+                <a16:creationId xmlns:a16="http://schemas.microsoft.com/office/drawing/2014/main" id="{0AA47DFC-429E-4E88-90CB-4EB3627F2B29}"/>
+              </a:ext>
+            </a:extLst>
+          </p:cNvPr>
+          <p:cNvPicPr>
+            <a:picLocks noChangeAspect="1"/>
+          </p:cNvPicPr>
+          <p:nvPr/>
+        </p:nvPicPr>
+        <p:blipFill>
+          <a:blip r:embed="rId5"/>
+          <a:stretch>
+            <a:fillRect/>
+          </a:stretch>
+        </p:blipFill>
+        <p:spPr>
+          <a:xfrm>
+            <a:off x="734697" y="1081363"/>
+            <a:ext cx="10722605" cy="642877"/>
+          </a:xfrm>
+          <a:prstGeom prst="rect">
+            <a:avLst/>
+          </a:prstGeom>
+        </p:spPr>
+      </p:pic>
+      <p:pic>
+        <p:nvPicPr>
+          <p:cNvPr id="8" name="Picture 7">
+            <a:extLst>
+              <a:ext uri="{FF2B5EF4-FFF2-40B4-BE49-F238E27FC236}">
+                <a16:creationId xmlns:a16="http://schemas.microsoft.com/office/drawing/2014/main" id="{F29F0C6A-5ED6-4875-BE99-27B5E5153ED1}"/>
+              </a:ext>
+            </a:extLst>
+          </p:cNvPr>
+          <p:cNvPicPr>
+            <a:picLocks noChangeAspect="1"/>
+          </p:cNvPicPr>
+          <p:nvPr/>
+        </p:nvPicPr>
+        <p:blipFill>
+          <a:blip r:embed="rId6"/>
+          <a:stretch>
+            <a:fillRect/>
+          </a:stretch>
+        </p:blipFill>
+        <p:spPr>
+          <a:xfrm>
+            <a:off x="625136" y="4309093"/>
+            <a:ext cx="3033712" cy="2358826"/>
+          </a:xfrm>
+          <a:prstGeom prst="rect">
+            <a:avLst/>
+          </a:prstGeom>
+        </p:spPr>
+      </p:pic>
+      <p:pic>
+        <p:nvPicPr>
+          <p:cNvPr id="10" name="Picture 9">
+            <a:extLst>
+              <a:ext uri="{FF2B5EF4-FFF2-40B4-BE49-F238E27FC236}">
+                <a16:creationId xmlns:a16="http://schemas.microsoft.com/office/drawing/2014/main" id="{38A55247-5CCB-4594-BEA0-B07DCFC58848}"/>
+              </a:ext>
+            </a:extLst>
+          </p:cNvPr>
+          <p:cNvPicPr>
+            <a:picLocks noChangeAspect="1"/>
+          </p:cNvPicPr>
+          <p:nvPr/>
+        </p:nvPicPr>
+        <p:blipFill>
+          <a:blip r:embed="rId7"/>
+          <a:stretch>
+            <a:fillRect/>
+          </a:stretch>
+        </p:blipFill>
+        <p:spPr>
+          <a:xfrm>
+            <a:off x="2574525" y="4659324"/>
+            <a:ext cx="9181730" cy="770729"/>
+          </a:xfrm>
+          <a:prstGeom prst="rect">
+            <a:avLst/>
+          </a:prstGeom>
+        </p:spPr>
+      </p:pic>
+      <p:pic>
+        <p:nvPicPr>
+          <p:cNvPr id="14" name="Picture 13">
+            <a:extLst>
+              <a:ext uri="{FF2B5EF4-FFF2-40B4-BE49-F238E27FC236}">
+                <a16:creationId xmlns:a16="http://schemas.microsoft.com/office/drawing/2014/main" id="{6A27C3EA-3551-41CA-9F94-24CE26ED71CD}"/>
+              </a:ext>
+            </a:extLst>
+          </p:cNvPr>
+          <p:cNvPicPr>
+            <a:picLocks noChangeAspect="1"/>
+          </p:cNvPicPr>
+          <p:nvPr/>
+        </p:nvPicPr>
+        <p:blipFill>
+          <a:blip r:embed="rId8"/>
+          <a:stretch>
+            <a:fillRect/>
+          </a:stretch>
+        </p:blipFill>
+        <p:spPr>
+          <a:xfrm>
+            <a:off x="2574525" y="4240224"/>
+            <a:ext cx="2390775" cy="419100"/>
+          </a:xfrm>
+          <a:prstGeom prst="rect">
+            <a:avLst/>
+          </a:prstGeom>
+        </p:spPr>
+      </p:pic>
+      <p:sp>
+        <p:nvSpPr>
+          <p:cNvPr id="15" name="TextBox 14">
+            <a:extLst>
+              <a:ext uri="{FF2B5EF4-FFF2-40B4-BE49-F238E27FC236}">
+                <a16:creationId xmlns:a16="http://schemas.microsoft.com/office/drawing/2014/main" id="{BD6DD217-563B-4D73-BEA4-26E0BB4BECDF}"/>
+              </a:ext>
+            </a:extLst>
+          </p:cNvPr>
+          <p:cNvSpPr txBox="1"/>
+          <p:nvPr/>
+        </p:nvSpPr>
+        <p:spPr>
+          <a:xfrm>
+            <a:off x="3672257" y="5545414"/>
+            <a:ext cx="5680461" cy="923330"/>
+          </a:xfrm>
+          <a:prstGeom prst="rect">
+            <a:avLst/>
+          </a:prstGeom>
+          <a:noFill/>
+        </p:spPr>
+        <p:txBody>
+          <a:bodyPr wrap="square" rtlCol="0">
+            <a:spAutoFit/>
+          </a:bodyPr>
+          <a:lstStyle/>
+          <a:p>
+            <a:r>
+              <a:rPr lang="en-US" dirty="0"/>
+              <a:t>Help @ Workshop if needed or read </a:t>
+            </a:r>
+            <a:r>
+              <a:rPr lang="en-GB" dirty="0">
+                <a:hlinkClick r:id="rId9"/>
+              </a:rPr>
+              <a:t>https://docs.microsoft.com/en-us/power-bi/fundamentals/service-self-service-signup-for-power-bi</a:t>
+            </a:r>
+            <a:endParaRPr lang="en-GB" dirty="0"/>
+          </a:p>
+        </p:txBody>
+      </p:sp>
+    </p:spTree>
+    <p:extLst>
+      <p:ext uri="{BB962C8B-B14F-4D97-AF65-F5344CB8AC3E}">
+        <p14:creationId xmlns:p14="http://schemas.microsoft.com/office/powerpoint/2010/main" val="2469590057"/>
+      </p:ext>
+    </p:extLst>
+  </p:cSld>
+  <p:clrMapOvr>
+    <a:masterClrMapping/>
+  </p:clrMapOvr>
+</p:sld>
+</file>
+
+<file path=ppt/slides/slide34.xml><?xml version="1.0" encoding="utf-8"?>
+<p:sld xmlns:a="http://schemas.openxmlformats.org/drawingml/2006/main" xmlns:r="http://schemas.openxmlformats.org/officeDocument/2006/relationships" xmlns:p="http://schemas.openxmlformats.org/presentationml/2006/main">
+  <p:cSld>
+    <p:spTree>
+      <p:nvGrpSpPr>
+        <p:cNvPr id="1" name=""/>
+        <p:cNvGrpSpPr/>
+        <p:nvPr/>
+      </p:nvGrpSpPr>
+      <p:grpSpPr>
+        <a:xfrm>
+          <a:off x="0" y="0"/>
+          <a:ext cx="0" cy="0"/>
+          <a:chOff x="0" y="0"/>
+          <a:chExt cx="0" cy="0"/>
+        </a:xfrm>
+      </p:grpSpPr>
+      <p:sp>
+        <p:nvSpPr>
+          <p:cNvPr id="2" name="Title 1">
+            <a:extLst>
+              <a:ext uri="{FF2B5EF4-FFF2-40B4-BE49-F238E27FC236}">
+                <a16:creationId xmlns:a16="http://schemas.microsoft.com/office/drawing/2014/main" id="{5AA6B643-3A9B-4A5F-A6D7-35CFAA1C5F20}"/>
+              </a:ext>
+            </a:extLst>
+          </p:cNvPr>
+          <p:cNvSpPr>
+            <a:spLocks noGrp="1"/>
+          </p:cNvSpPr>
+          <p:nvPr>
+            <p:ph type="title"/>
+          </p:nvPr>
+        </p:nvSpPr>
+        <p:spPr/>
+        <p:txBody>
+          <a:bodyPr/>
+          <a:lstStyle/>
+          <a:p>
+            <a:r>
+              <a:rPr lang="en-GB" dirty="0"/>
+              <a:t>Social Media : Meetup , </a:t>
+            </a:r>
+            <a:r>
+              <a:rPr lang="en-GB" dirty="0" err="1"/>
+              <a:t>LinkedIN</a:t>
+            </a:r>
+            <a:r>
+              <a:rPr lang="en-GB" dirty="0"/>
+              <a:t>, YouTube</a:t>
+            </a:r>
+          </a:p>
+        </p:txBody>
+      </p:sp>
+      <p:pic>
+        <p:nvPicPr>
+          <p:cNvPr id="4" name="Picture 3">
+            <a:extLst>
+              <a:ext uri="{FF2B5EF4-FFF2-40B4-BE49-F238E27FC236}">
+                <a16:creationId xmlns:a16="http://schemas.microsoft.com/office/drawing/2014/main" id="{4D0E3523-D433-4D78-ADC0-6E0DD481F268}"/>
+              </a:ext>
+            </a:extLst>
+          </p:cNvPr>
+          <p:cNvPicPr>
+            <a:picLocks noChangeAspect="1"/>
+          </p:cNvPicPr>
+          <p:nvPr/>
+        </p:nvPicPr>
+        <p:blipFill>
+          <a:blip r:embed="rId2"/>
+          <a:stretch>
+            <a:fillRect/>
+          </a:stretch>
+        </p:blipFill>
+        <p:spPr>
+          <a:xfrm>
+            <a:off x="990600" y="1895903"/>
+            <a:ext cx="9944100" cy="3336682"/>
+          </a:xfrm>
+          <a:prstGeom prst="rect">
+            <a:avLst/>
+          </a:prstGeom>
+        </p:spPr>
+      </p:pic>
+    </p:spTree>
+    <p:extLst>
+      <p:ext uri="{BB962C8B-B14F-4D97-AF65-F5344CB8AC3E}">
+        <p14:creationId xmlns:p14="http://schemas.microsoft.com/office/powerpoint/2010/main" val="1082092643"/>
+      </p:ext>
+    </p:extLst>
+  </p:cSld>
+  <p:clrMapOvr>
+    <a:masterClrMapping/>
+  </p:clrMapOvr>
+</p:sld>
+</file>
+
+<file path=ppt/slides/slide35.xml><?xml version="1.0" encoding="utf-8"?>
+<p:sld xmlns:a="http://schemas.openxmlformats.org/drawingml/2006/main" xmlns:r="http://schemas.openxmlformats.org/officeDocument/2006/relationships" xmlns:p="http://schemas.openxmlformats.org/presentationml/2006/main">
+  <p:cSld>
+    <p:spTree>
+      <p:nvGrpSpPr>
+        <p:cNvPr id="1" name=""/>
+        <p:cNvGrpSpPr/>
+        <p:nvPr/>
+      </p:nvGrpSpPr>
+      <p:grpSpPr>
+        <a:xfrm>
+          <a:off x="0" y="0"/>
+          <a:ext cx="0" cy="0"/>
+          <a:chOff x="0" y="0"/>
+          <a:chExt cx="0" cy="0"/>
+        </a:xfrm>
+      </p:grpSpPr>
+      <p:sp>
+        <p:nvSpPr>
+          <p:cNvPr id="2" name="Title 1">
+            <a:extLst>
+              <a:ext uri="{FF2B5EF4-FFF2-40B4-BE49-F238E27FC236}">
+                <a16:creationId xmlns:a16="http://schemas.microsoft.com/office/drawing/2014/main" id="{EBA23355-EE1E-4808-88FA-1B3E36E028B0}"/>
+              </a:ext>
+            </a:extLst>
+          </p:cNvPr>
+          <p:cNvSpPr>
+            <a:spLocks noGrp="1"/>
+          </p:cNvSpPr>
+          <p:nvPr>
+            <p:ph type="title"/>
+          </p:nvPr>
+        </p:nvSpPr>
+        <p:spPr/>
+        <p:txBody>
+          <a:bodyPr/>
+          <a:lstStyle/>
+          <a:p>
+            <a:r>
+              <a:rPr lang="en-GB" dirty="0"/>
+              <a:t>You Tube</a:t>
+            </a:r>
+          </a:p>
+        </p:txBody>
+      </p:sp>
+      <p:sp>
+        <p:nvSpPr>
+          <p:cNvPr id="4" name="TextBox 3">
+            <a:extLst>
+              <a:ext uri="{FF2B5EF4-FFF2-40B4-BE49-F238E27FC236}">
+                <a16:creationId xmlns:a16="http://schemas.microsoft.com/office/drawing/2014/main" id="{172C685E-E660-4F28-BDC0-9B85B9ADEB6A}"/>
+              </a:ext>
+            </a:extLst>
+          </p:cNvPr>
+          <p:cNvSpPr txBox="1"/>
+          <p:nvPr/>
+        </p:nvSpPr>
+        <p:spPr>
+          <a:xfrm>
+            <a:off x="904875" y="1367522"/>
+            <a:ext cx="7505700" cy="369332"/>
+          </a:xfrm>
+          <a:prstGeom prst="rect">
+            <a:avLst/>
+          </a:prstGeom>
+          <a:noFill/>
+        </p:spPr>
+        <p:txBody>
+          <a:bodyPr wrap="square">
+            <a:spAutoFit/>
+          </a:bodyPr>
+          <a:lstStyle/>
+          <a:p>
+            <a:r>
+              <a:rPr lang="en-GB" dirty="0"/>
+              <a:t>https://www.youtube.com/channel/UCDtmmwK3YxWqzDNZ5L3pdMw</a:t>
+            </a:r>
+          </a:p>
+        </p:txBody>
+      </p:sp>
+      <p:pic>
+        <p:nvPicPr>
+          <p:cNvPr id="6" name="Picture 5">
+            <a:extLst>
+              <a:ext uri="{FF2B5EF4-FFF2-40B4-BE49-F238E27FC236}">
+                <a16:creationId xmlns:a16="http://schemas.microsoft.com/office/drawing/2014/main" id="{EF6F945A-979B-4115-BECB-A5159532CBE1}"/>
+              </a:ext>
+            </a:extLst>
+          </p:cNvPr>
+          <p:cNvPicPr>
+            <a:picLocks noChangeAspect="1"/>
+          </p:cNvPicPr>
+          <p:nvPr/>
+        </p:nvPicPr>
+        <p:blipFill>
+          <a:blip r:embed="rId2"/>
+          <a:stretch>
+            <a:fillRect/>
+          </a:stretch>
+        </p:blipFill>
+        <p:spPr>
+          <a:xfrm>
+            <a:off x="1811557" y="2105025"/>
+            <a:ext cx="8568885" cy="4290706"/>
+          </a:xfrm>
+          <a:prstGeom prst="rect">
+            <a:avLst/>
+          </a:prstGeom>
+        </p:spPr>
+      </p:pic>
+    </p:spTree>
+    <p:extLst>
+      <p:ext uri="{BB962C8B-B14F-4D97-AF65-F5344CB8AC3E}">
+        <p14:creationId xmlns:p14="http://schemas.microsoft.com/office/powerpoint/2010/main" val="2920224800"/>
+      </p:ext>
+    </p:extLst>
+  </p:cSld>
+  <p:clrMapOvr>
+    <a:masterClrMapping/>
+  </p:clrMapOvr>
+</p:sld>
+</file>
+
+<file path=ppt/slides/slide36.xml><?xml version="1.0" encoding="utf-8"?>
+<p:sld xmlns:a="http://schemas.openxmlformats.org/drawingml/2006/main" xmlns:r="http://schemas.openxmlformats.org/officeDocument/2006/relationships" xmlns:p="http://schemas.openxmlformats.org/presentationml/2006/main">
+  <p:cSld>
+    <p:spTree>
+      <p:nvGrpSpPr>
+        <p:cNvPr id="1" name=""/>
+        <p:cNvGrpSpPr/>
+        <p:nvPr/>
+      </p:nvGrpSpPr>
+      <p:grpSpPr>
+        <a:xfrm>
+          <a:off x="0" y="0"/>
+          <a:ext cx="0" cy="0"/>
+          <a:chOff x="0" y="0"/>
+          <a:chExt cx="0" cy="0"/>
+        </a:xfrm>
+      </p:grpSpPr>
+      <p:sp>
+        <p:nvSpPr>
+          <p:cNvPr id="2" name="Title 1">
+            <a:extLst>
+              <a:ext uri="{FF2B5EF4-FFF2-40B4-BE49-F238E27FC236}">
+                <a16:creationId xmlns:a16="http://schemas.microsoft.com/office/drawing/2014/main" id="{B47FDD0F-CBB9-40BD-9867-2904FBBF02D3}"/>
+              </a:ext>
+            </a:extLst>
+          </p:cNvPr>
+          <p:cNvSpPr>
+            <a:spLocks noGrp="1"/>
+          </p:cNvSpPr>
+          <p:nvPr>
+            <p:ph type="title"/>
+          </p:nvPr>
+        </p:nvSpPr>
+        <p:spPr/>
+        <p:txBody>
+          <a:bodyPr/>
+          <a:lstStyle/>
+          <a:p>
+            <a:r>
+              <a:rPr lang="en-GB" dirty="0"/>
+              <a:t>The End</a:t>
+            </a:r>
+          </a:p>
+        </p:txBody>
+      </p:sp>
+      <p:pic>
+        <p:nvPicPr>
+          <p:cNvPr id="6" name="Online Media 5" title="Thats all Folks (Rare)">
+            <a:hlinkClick r:id="" action="ppaction://media"/>
+            <a:extLst>
+              <a:ext uri="{FF2B5EF4-FFF2-40B4-BE49-F238E27FC236}">
+                <a16:creationId xmlns:a16="http://schemas.microsoft.com/office/drawing/2014/main" id="{CE4314A2-C148-4820-8A92-F2A455447FEE}"/>
+              </a:ext>
+            </a:extLst>
+          </p:cNvPr>
+          <p:cNvPicPr>
+            <a:picLocks noRot="1" noChangeAspect="1"/>
+          </p:cNvPicPr>
+          <p:nvPr>
+            <a:videoFile r:link="rId1"/>
+          </p:nvPr>
+        </p:nvPicPr>
+        <p:blipFill>
+          <a:blip r:embed="rId3"/>
+          <a:stretch>
+            <a:fillRect/>
+          </a:stretch>
+        </p:blipFill>
+        <p:spPr>
+          <a:xfrm>
+            <a:off x="3048000" y="1714500"/>
+            <a:ext cx="6096000" cy="3429000"/>
+          </a:xfrm>
+          <a:prstGeom prst="rect">
+            <a:avLst/>
+          </a:prstGeom>
+        </p:spPr>
+      </p:pic>
+      <p:pic>
+        <p:nvPicPr>
+          <p:cNvPr id="4" name="Content Placeholder 4">
+            <a:extLst>
+              <a:ext uri="{FF2B5EF4-FFF2-40B4-BE49-F238E27FC236}">
+                <a16:creationId xmlns:a16="http://schemas.microsoft.com/office/drawing/2014/main" id="{A26EAD1F-A79C-4A41-BF98-239E74362EA5}"/>
+              </a:ext>
+            </a:extLst>
+          </p:cNvPr>
+          <p:cNvPicPr>
+            <a:picLocks noChangeAspect="1"/>
+          </p:cNvPicPr>
+          <p:nvPr/>
+        </p:nvPicPr>
+        <p:blipFill>
+          <a:blip r:embed="rId4">
+            <a:extLst>
+              <a:ext uri="{28A0092B-C50C-407E-A947-70E740481C1C}">
+                <a14:useLocalDpi xmlns:a14="http://schemas.microsoft.com/office/drawing/2010/main" val="0"/>
+              </a:ext>
+            </a:extLst>
+          </a:blip>
+          <a:stretch>
+            <a:fillRect/>
+          </a:stretch>
+        </p:blipFill>
+        <p:spPr>
+          <a:xfrm>
+            <a:off x="9683527" y="5953125"/>
+            <a:ext cx="2383530" cy="786624"/>
+          </a:xfrm>
+          <a:prstGeom prst="rect">
+            <a:avLst/>
+          </a:prstGeom>
+        </p:spPr>
+      </p:pic>
+    </p:spTree>
+    <p:extLst>
+      <p:ext uri="{BB962C8B-B14F-4D97-AF65-F5344CB8AC3E}">
+        <p14:creationId xmlns:p14="http://schemas.microsoft.com/office/powerpoint/2010/main" val="2637866760"/>
+      </p:ext>
+    </p:extLst>
+  </p:cSld>
+  <p:clrMapOvr>
+    <a:masterClrMapping/>
+  </p:clrMapOvr>
+  <p:timing>
+    <p:tnLst>
+      <p:par>
+        <p:cTn id="1" dur="indefinite" restart="never" nodeType="tmRoot">
+          <p:childTnLst>
+            <p:seq concurrent="1" nextAc="seek">
+              <p:cTn id="2" dur="indefinite" nodeType="mainSeq">
+                <p:childTnLst>
+                  <p:par>
+                    <p:cTn id="3" fill="hold">
+                      <p:stCondLst>
+                        <p:cond delay="indefinite"/>
+                      </p:stCondLst>
+                      <p:childTnLst>
+                        <p:par>
+                          <p:cTn id="4" fill="hold">
+                            <p:stCondLst>
+                              <p:cond delay="0"/>
+                            </p:stCondLst>
+                            <p:childTnLst>
+                              <p:par>
+                                <p:cTn id="5" presetID="1" presetClass="mediacall" presetSubtype="0" fill="hold" nodeType="clickEffect">
+                                  <p:stCondLst>
+                                    <p:cond delay="0"/>
+                                  </p:stCondLst>
+                                  <p:childTnLst>
+                                    <p:cmd type="call" cmd="playFrom(0.0)">
+                                      <p:cBhvr>
+                                        <p:cTn id="6" dur="1" fill="hold"/>
+                                        <p:tgtEl>
+                                          <p:spTgt spid="6"/>
+                                        </p:tgtEl>
+                                      </p:cBhvr>
+                                    </p:cmd>
+                                  </p:childTnLst>
+                                </p:cTn>
+                              </p:par>
+                            </p:childTnLst>
+                          </p:cTn>
+                        </p:par>
+                      </p:childTnLst>
+                    </p:cTn>
+                  </p:par>
+                </p:childTnLst>
+              </p:cTn>
+              <p:prevCondLst>
+                <p:cond evt="onPrev" delay="0">
+                  <p:tgtEl>
+                    <p:sldTgt/>
+                  </p:tgtEl>
+                </p:cond>
+              </p:prevCondLst>
+              <p:nextCondLst>
+                <p:cond evt="onNext" delay="0">
+                  <p:tgtEl>
+                    <p:sldTgt/>
+                  </p:tgtEl>
+                </p:cond>
+              </p:nextCondLst>
+            </p:seq>
+            <p:video>
+              <p:cMediaNode vol="80000">
+                <p:cTn id="7" fill="hold" display="0">
+                  <p:stCondLst>
+                    <p:cond delay="indefinite"/>
+                  </p:stCondLst>
+                </p:cTn>
+                <p:tgtEl>
+                  <p:spTgt spid="6"/>
+                </p:tgtEl>
+              </p:cMediaNode>
+            </p:video>
+            <p:seq concurrent="1" nextAc="seek">
+              <p:cTn id="8" restart="whenNotActive" fill="hold" evtFilter="cancelBubble" nodeType="interactiveSeq">
+                <p:stCondLst>
+                  <p:cond evt="onClick" delay="0">
+                    <p:tgtEl>
+                      <p:spTgt spid="6"/>
+                    </p:tgtEl>
+                  </p:cond>
+                </p:stCondLst>
+                <p:endSync evt="end" delay="0">
+                  <p:rtn val="all"/>
+                </p:endSync>
+                <p:childTnLst>
+                  <p:par>
+                    <p:cTn id="9" fill="hold">
+                      <p:stCondLst>
+                        <p:cond delay="0"/>
+                      </p:stCondLst>
+                      <p:childTnLst>
+                        <p:par>
+                          <p:cTn id="10" fill="hold">
+                            <p:stCondLst>
+                              <p:cond delay="0"/>
+                            </p:stCondLst>
+                            <p:childTnLst>
+                              <p:par>
+                                <p:cTn id="11" presetID="2" presetClass="mediacall" presetSubtype="0" fill="hold" nodeType="clickEffect">
+                                  <p:stCondLst>
+                                    <p:cond delay="0"/>
+                                  </p:stCondLst>
+                                  <p:childTnLst>
+                                    <p:cmd type="call" cmd="togglePause">
+                                      <p:cBhvr>
+                                        <p:cTn id="12" dur="1" fill="hold"/>
+                                        <p:tgtEl>
+                                          <p:spTgt spid="6"/>
+                                        </p:tgtEl>
+                                      </p:cBhvr>
+                                    </p:cmd>
+                                  </p:childTnLst>
+                                </p:cTn>
+                              </p:par>
+                            </p:childTnLst>
+                          </p:cTn>
+                        </p:par>
+                      </p:childTnLst>
+                    </p:cTn>
+                  </p:par>
+                </p:childTnLst>
+              </p:cTn>
+              <p:nextCondLst>
+                <p:cond evt="onClick" delay="0">
+                  <p:tgtEl>
+                    <p:spTgt spid="6"/>
+                  </p:tgtEl>
+                </p:cond>
+              </p:nextCondLst>
+            </p:seq>
+          </p:childTnLst>
+        </p:cTn>
+      </p:par>
+    </p:tnLst>
+  </p:timing>
+</p:sld>
+</file>
+
+<file path=ppt/slides/slide37.xml><?xml version="1.0" encoding="utf-8"?>
+<p:sld xmlns:a="http://schemas.openxmlformats.org/drawingml/2006/main" xmlns:r="http://schemas.openxmlformats.org/officeDocument/2006/relationships" xmlns:p="http://schemas.openxmlformats.org/presentationml/2006/main">
+  <p:cSld>
+    <p:spTree>
+      <p:nvGrpSpPr>
+        <p:cNvPr id="1" name=""/>
+        <p:cNvGrpSpPr/>
+        <p:nvPr/>
+      </p:nvGrpSpPr>
+      <p:grpSpPr>
+        <a:xfrm>
+          <a:off x="0" y="0"/>
+          <a:ext cx="0" cy="0"/>
+          <a:chOff x="0" y="0"/>
+          <a:chExt cx="0" cy="0"/>
+        </a:xfrm>
+      </p:grpSpPr>
+      <p:sp>
+        <p:nvSpPr>
+          <p:cNvPr id="2" name="Title 1">
+            <a:extLst>
+              <a:ext uri="{FF2B5EF4-FFF2-40B4-BE49-F238E27FC236}">
+                <a16:creationId xmlns:a16="http://schemas.microsoft.com/office/drawing/2014/main" id="{52741A15-161D-48E6-824E-99C6FC1D509E}"/>
+              </a:ext>
+            </a:extLst>
+          </p:cNvPr>
+          <p:cNvSpPr>
+            <a:spLocks noGrp="1"/>
+          </p:cNvSpPr>
+          <p:nvPr>
+            <p:ph type="title"/>
+          </p:nvPr>
+        </p:nvSpPr>
+        <p:spPr/>
+        <p:txBody>
+          <a:bodyPr/>
+          <a:lstStyle/>
+          <a:p>
+            <a:r>
+              <a:rPr lang="en-GB" dirty="0"/>
+              <a:t>Blank – end of Lesson</a:t>
+            </a:r>
+          </a:p>
+        </p:txBody>
+      </p:sp>
+    </p:spTree>
+    <p:extLst>
+      <p:ext uri="{BB962C8B-B14F-4D97-AF65-F5344CB8AC3E}">
+        <p14:creationId xmlns:p14="http://schemas.microsoft.com/office/powerpoint/2010/main" val="2020143793"/>
+      </p:ext>
+    </p:extLst>
+  </p:cSld>
+  <p:clrMapOvr>
+    <a:masterClrMapping/>
+  </p:clrMapOvr>
+</p:sld>
+</file>
+
+<file path=ppt/slides/slide38.xml><?xml version="1.0" encoding="utf-8"?>
+<p:sld xmlns:a="http://schemas.openxmlformats.org/drawingml/2006/main" xmlns:r="http://schemas.openxmlformats.org/officeDocument/2006/relationships" xmlns:p="http://schemas.openxmlformats.org/presentationml/2006/main">
+  <p:cSld>
+    <p:spTree>
+      <p:nvGrpSpPr>
+        <p:cNvPr id="1" name=""/>
+        <p:cNvGrpSpPr/>
+        <p:nvPr/>
+      </p:nvGrpSpPr>
+      <p:grpSpPr>
+        <a:xfrm>
+          <a:off x="0" y="0"/>
+          <a:ext cx="0" cy="0"/>
+          <a:chOff x="0" y="0"/>
+          <a:chExt cx="0" cy="0"/>
+        </a:xfrm>
+      </p:grpSpPr>
+      <p:sp>
+        <p:nvSpPr>
+          <p:cNvPr id="2" name="Title 1">
+            <a:extLst>
+              <a:ext uri="{FF2B5EF4-FFF2-40B4-BE49-F238E27FC236}">
+                <a16:creationId xmlns:a16="http://schemas.microsoft.com/office/drawing/2014/main" id="{36C6852C-8E3C-4B57-A596-1BB7C4900700}"/>
+              </a:ext>
+            </a:extLst>
+          </p:cNvPr>
+          <p:cNvSpPr>
+            <a:spLocks noGrp="1"/>
+          </p:cNvSpPr>
+          <p:nvPr>
+            <p:ph type="ctrTitle"/>
+          </p:nvPr>
+        </p:nvSpPr>
+        <p:spPr>
+          <a:xfrm>
+            <a:off x="1524000" y="1016210"/>
+            <a:ext cx="9144000" cy="1655762"/>
+          </a:xfrm>
+        </p:spPr>
+        <p:txBody>
+          <a:bodyPr>
+            <a:normAutofit fontScale="90000"/>
+          </a:bodyPr>
+          <a:lstStyle/>
+          <a:p>
+            <a:r>
+              <a:rPr lang="en-GB" dirty="0"/>
+              <a:t>Microsoft Power BI training</a:t>
+            </a:r>
+            <a:br>
+              <a:rPr lang="en-GB" dirty="0"/>
+            </a:br>
+            <a:r>
+              <a:rPr lang="en-GB" dirty="0"/>
+              <a:t>Week 3</a:t>
+            </a:r>
+            <a:br>
+              <a:rPr lang="en-GB" dirty="0"/>
+            </a:br>
+            <a:r>
+              <a:rPr lang="en-GB" dirty="0"/>
+              <a:t>Power Bi for Business Users</a:t>
+            </a:r>
+          </a:p>
+        </p:txBody>
+      </p:sp>
+      <p:sp>
+        <p:nvSpPr>
+          <p:cNvPr id="3" name="Subtitle 2">
+            <a:extLst>
+              <a:ext uri="{FF2B5EF4-FFF2-40B4-BE49-F238E27FC236}">
+                <a16:creationId xmlns:a16="http://schemas.microsoft.com/office/drawing/2014/main" id="{400E41FA-8244-4945-973F-022497D7ED6E}"/>
+              </a:ext>
+            </a:extLst>
+          </p:cNvPr>
+          <p:cNvSpPr>
+            <a:spLocks noGrp="1"/>
+          </p:cNvSpPr>
+          <p:nvPr>
+            <p:ph type="subTitle" idx="1"/>
+          </p:nvPr>
+        </p:nvSpPr>
+        <p:spPr/>
+        <p:txBody>
+          <a:bodyPr/>
+          <a:lstStyle/>
+          <a:p>
+            <a:r>
+              <a:rPr lang="en-GB" dirty="0"/>
+              <a:t>The </a:t>
+            </a:r>
+            <a:r>
+              <a:rPr lang="en-GB" dirty="0" err="1"/>
+              <a:t>LandMark</a:t>
+            </a:r>
+            <a:r>
+              <a:rPr lang="en-GB" dirty="0"/>
+              <a:t>, School Lane, Burnley. BB11 1UF</a:t>
+            </a:r>
+          </a:p>
+          <a:p>
+            <a:r>
+              <a:rPr lang="en-GB" dirty="0"/>
+              <a:t>Monday 25</a:t>
+            </a:r>
+            <a:r>
+              <a:rPr lang="en-GB" baseline="30000" dirty="0"/>
+              <a:t>th</a:t>
+            </a:r>
+            <a:r>
+              <a:rPr lang="en-GB" dirty="0"/>
+              <a:t> October 17:00 – 18:30</a:t>
+            </a:r>
+          </a:p>
+          <a:p>
+            <a:r>
+              <a:rPr lang="en-GB" dirty="0"/>
+              <a:t>www.landmarkburnley.co.uk</a:t>
+            </a:r>
+          </a:p>
+        </p:txBody>
+      </p:sp>
+      <p:pic>
+        <p:nvPicPr>
+          <p:cNvPr id="4" name="Content Placeholder 4">
+            <a:extLst>
+              <a:ext uri="{FF2B5EF4-FFF2-40B4-BE49-F238E27FC236}">
+                <a16:creationId xmlns:a16="http://schemas.microsoft.com/office/drawing/2014/main" id="{7077F2C3-BC57-4754-A4DB-DB64DDC1F8F9}"/>
+              </a:ext>
+            </a:extLst>
+          </p:cNvPr>
+          <p:cNvPicPr>
+            <a:picLocks noChangeAspect="1"/>
+          </p:cNvPicPr>
+          <p:nvPr/>
+        </p:nvPicPr>
+        <p:blipFill>
+          <a:blip r:embed="rId3">
+            <a:extLst>
+              <a:ext uri="{28A0092B-C50C-407E-A947-70E740481C1C}">
+                <a14:useLocalDpi xmlns:a14="http://schemas.microsoft.com/office/drawing/2010/main" val="0"/>
+              </a:ext>
+            </a:extLst>
+          </a:blip>
+          <a:stretch>
+            <a:fillRect/>
+          </a:stretch>
+        </p:blipFill>
+        <p:spPr>
+          <a:xfrm>
+            <a:off x="9683527" y="5953125"/>
+            <a:ext cx="2383530" cy="786624"/>
+          </a:xfrm>
+          <a:prstGeom prst="rect">
+            <a:avLst/>
+          </a:prstGeom>
+        </p:spPr>
+      </p:pic>
+      <p:pic>
+        <p:nvPicPr>
+          <p:cNvPr id="6" name="Picture 5" descr="Text&#10;&#10;Description automatically generated">
+            <a:extLst>
+              <a:ext uri="{FF2B5EF4-FFF2-40B4-BE49-F238E27FC236}">
+                <a16:creationId xmlns:a16="http://schemas.microsoft.com/office/drawing/2014/main" id="{0B4A0D9C-62CD-4690-B79B-48239694ADA4}"/>
+              </a:ext>
+            </a:extLst>
+          </p:cNvPr>
+          <p:cNvPicPr>
+            <a:picLocks noChangeAspect="1"/>
+          </p:cNvPicPr>
+          <p:nvPr/>
+        </p:nvPicPr>
+        <p:blipFill>
+          <a:blip r:embed="rId4">
+            <a:extLst>
+              <a:ext uri="{28A0092B-C50C-407E-A947-70E740481C1C}">
+                <a14:useLocalDpi xmlns:a14="http://schemas.microsoft.com/office/drawing/2010/main" val="0"/>
+              </a:ext>
+            </a:extLst>
+          </a:blip>
+          <a:stretch>
+            <a:fillRect/>
+          </a:stretch>
+        </p:blipFill>
+        <p:spPr>
+          <a:xfrm>
+            <a:off x="297793" y="5166500"/>
+            <a:ext cx="3956967" cy="1968457"/>
+          </a:xfrm>
+          <a:prstGeom prst="rect">
+            <a:avLst/>
+          </a:prstGeom>
+        </p:spPr>
+      </p:pic>
+      <p:pic>
+        <p:nvPicPr>
+          <p:cNvPr id="7" name="Picture 6">
+            <a:extLst>
+              <a:ext uri="{FF2B5EF4-FFF2-40B4-BE49-F238E27FC236}">
+                <a16:creationId xmlns:a16="http://schemas.microsoft.com/office/drawing/2014/main" id="{26640956-4441-47A0-9A17-7DE21B82124F}"/>
+              </a:ext>
+            </a:extLst>
+          </p:cNvPr>
+          <p:cNvPicPr>
+            <a:picLocks noChangeAspect="1"/>
+          </p:cNvPicPr>
+          <p:nvPr/>
+        </p:nvPicPr>
+        <p:blipFill>
+          <a:blip r:embed="rId5">
+            <a:extLst>
+              <a:ext uri="{28A0092B-C50C-407E-A947-70E740481C1C}">
+                <a14:useLocalDpi xmlns:a14="http://schemas.microsoft.com/office/drawing/2010/main" val="0"/>
+              </a:ext>
+            </a:extLst>
+          </a:blip>
+          <a:stretch>
+            <a:fillRect/>
+          </a:stretch>
+        </p:blipFill>
+        <p:spPr>
+          <a:xfrm>
+            <a:off x="5603085" y="5349875"/>
+            <a:ext cx="1748578" cy="1288075"/>
+          </a:xfrm>
+          <a:prstGeom prst="rect">
+            <a:avLst/>
+          </a:prstGeom>
+        </p:spPr>
+      </p:pic>
+    </p:spTree>
+    <p:extLst>
+      <p:ext uri="{BB962C8B-B14F-4D97-AF65-F5344CB8AC3E}">
+        <p14:creationId xmlns:p14="http://schemas.microsoft.com/office/powerpoint/2010/main" val="928279745"/>
+      </p:ext>
+    </p:extLst>
+  </p:cSld>
+  <p:clrMapOvr>
+    <a:masterClrMapping/>
+  </p:clrMapOvr>
+</p:sld>
+</file>
+
+<file path=ppt/slides/slide39.xml><?xml version="1.0" encoding="utf-8"?>
+<p:sld xmlns:a="http://schemas.openxmlformats.org/drawingml/2006/main" xmlns:r="http://schemas.openxmlformats.org/officeDocument/2006/relationships" xmlns:p="http://schemas.openxmlformats.org/presentationml/2006/main">
+  <p:cSld>
+    <p:spTree>
+      <p:nvGrpSpPr>
+        <p:cNvPr id="1" name=""/>
+        <p:cNvGrpSpPr/>
+        <p:nvPr/>
+      </p:nvGrpSpPr>
+      <p:grpSpPr>
+        <a:xfrm>
+          <a:off x="0" y="0"/>
+          <a:ext cx="0" cy="0"/>
+          <a:chOff x="0" y="0"/>
+          <a:chExt cx="0" cy="0"/>
+        </a:xfrm>
+      </p:grpSpPr>
+      <p:pic>
+        <p:nvPicPr>
+          <p:cNvPr id="3" name="Picture 2">
+            <a:extLst>
+              <a:ext uri="{FF2B5EF4-FFF2-40B4-BE49-F238E27FC236}">
+                <a16:creationId xmlns:a16="http://schemas.microsoft.com/office/drawing/2014/main" id="{9A4A2851-5AB9-46DC-9B9E-B600646DE1B6}"/>
+              </a:ext>
+            </a:extLst>
+          </p:cNvPr>
+          <p:cNvPicPr>
+            <a:picLocks noChangeAspect="1"/>
+          </p:cNvPicPr>
+          <p:nvPr/>
+        </p:nvPicPr>
+        <p:blipFill>
+          <a:blip r:embed="rId2"/>
+          <a:stretch>
+            <a:fillRect/>
+          </a:stretch>
+        </p:blipFill>
+        <p:spPr>
+          <a:xfrm>
+            <a:off x="1979019" y="2400422"/>
+            <a:ext cx="7875195" cy="3991963"/>
+          </a:xfrm>
+          <a:prstGeom prst="rect">
+            <a:avLst/>
+          </a:prstGeom>
+        </p:spPr>
+      </p:pic>
+      <p:sp>
+        <p:nvSpPr>
+          <p:cNvPr id="4" name="TextBox 3">
+            <a:extLst>
+              <a:ext uri="{FF2B5EF4-FFF2-40B4-BE49-F238E27FC236}">
+                <a16:creationId xmlns:a16="http://schemas.microsoft.com/office/drawing/2014/main" id="{4C31C0F4-C8DB-404C-B7B8-0F3627D5E627}"/>
+              </a:ext>
+            </a:extLst>
+          </p:cNvPr>
+          <p:cNvSpPr txBox="1"/>
+          <p:nvPr/>
+        </p:nvSpPr>
+        <p:spPr>
+          <a:xfrm>
+            <a:off x="1979018" y="979126"/>
+            <a:ext cx="7875195" cy="1200329"/>
+          </a:xfrm>
+          <a:prstGeom prst="rect">
+            <a:avLst/>
+          </a:prstGeom>
+          <a:solidFill>
+            <a:schemeClr val="tx1">
+              <a:lumMod val="65000"/>
+              <a:lumOff val="35000"/>
+            </a:schemeClr>
+          </a:solidFill>
+        </p:spPr>
+        <p:txBody>
+          <a:bodyPr wrap="square" rtlCol="0">
+            <a:spAutoFit/>
+          </a:bodyPr>
+          <a:lstStyle/>
+          <a:p>
+            <a:pPr algn="ctr"/>
+            <a:r>
+              <a:rPr lang="en-GB" sz="5400" dirty="0">
+                <a:solidFill>
+                  <a:schemeClr val="bg1"/>
+                </a:solidFill>
+              </a:rPr>
+              <a:t>Power BI – LESSON 3 of 10</a:t>
+            </a:r>
+          </a:p>
+          <a:p>
+            <a:pPr algn="ctr"/>
+            <a:r>
+              <a:rPr lang="en-GB" dirty="0">
+                <a:solidFill>
+                  <a:schemeClr val="bg1"/>
+                </a:solidFill>
+              </a:rPr>
+              <a:t>beginners free training course</a:t>
+            </a:r>
+          </a:p>
+        </p:txBody>
+      </p:sp>
+      <p:pic>
+        <p:nvPicPr>
+          <p:cNvPr id="5" name="Content Placeholder 4">
+            <a:extLst>
+              <a:ext uri="{FF2B5EF4-FFF2-40B4-BE49-F238E27FC236}">
+                <a16:creationId xmlns:a16="http://schemas.microsoft.com/office/drawing/2014/main" id="{F9431256-C074-414D-AC78-E2FB477B7767}"/>
+              </a:ext>
+            </a:extLst>
+          </p:cNvPr>
+          <p:cNvPicPr>
+            <a:picLocks noChangeAspect="1"/>
+          </p:cNvPicPr>
+          <p:nvPr/>
+        </p:nvPicPr>
+        <p:blipFill>
+          <a:blip r:embed="rId3">
+            <a:extLst>
+              <a:ext uri="{28A0092B-C50C-407E-A947-70E740481C1C}">
+                <a14:useLocalDpi xmlns:a14="http://schemas.microsoft.com/office/drawing/2010/main" val="0"/>
+              </a:ext>
+            </a:extLst>
+          </a:blip>
+          <a:stretch>
+            <a:fillRect/>
+          </a:stretch>
+        </p:blipFill>
+        <p:spPr>
+          <a:xfrm>
+            <a:off x="3864550" y="4699738"/>
+            <a:ext cx="1923689" cy="634865"/>
+          </a:xfrm>
+          <a:prstGeom prst="rect">
+            <a:avLst/>
+          </a:prstGeom>
+        </p:spPr>
+      </p:pic>
+    </p:spTree>
+    <p:extLst>
+      <p:ext uri="{BB962C8B-B14F-4D97-AF65-F5344CB8AC3E}">
+        <p14:creationId xmlns:p14="http://schemas.microsoft.com/office/powerpoint/2010/main" val="2853283930"/>
       </p:ext>
     </p:extLst>
   </p:cSld>
@@ -9245,6 +12228,1082 @@
     <p:extLst>
       <p:ext uri="{BB962C8B-B14F-4D97-AF65-F5344CB8AC3E}">
         <p14:creationId xmlns:p14="http://schemas.microsoft.com/office/powerpoint/2010/main" val="475240035"/>
+      </p:ext>
+    </p:extLst>
+  </p:cSld>
+  <p:clrMapOvr>
+    <a:masterClrMapping/>
+  </p:clrMapOvr>
+</p:sld>
+</file>
+
+<file path=ppt/slides/slide40.xml><?xml version="1.0" encoding="utf-8"?>
+<p:sld xmlns:a="http://schemas.openxmlformats.org/drawingml/2006/main" xmlns:r="http://schemas.openxmlformats.org/officeDocument/2006/relationships" xmlns:p="http://schemas.openxmlformats.org/presentationml/2006/main">
+  <p:cSld>
+    <p:spTree>
+      <p:nvGrpSpPr>
+        <p:cNvPr id="1" name=""/>
+        <p:cNvGrpSpPr/>
+        <p:nvPr/>
+      </p:nvGrpSpPr>
+      <p:grpSpPr>
+        <a:xfrm>
+          <a:off x="0" y="0"/>
+          <a:ext cx="0" cy="0"/>
+          <a:chOff x="0" y="0"/>
+          <a:chExt cx="0" cy="0"/>
+        </a:xfrm>
+      </p:grpSpPr>
+      <p:sp>
+        <p:nvSpPr>
+          <p:cNvPr id="4" name="TextBox 3">
+            <a:extLst>
+              <a:ext uri="{FF2B5EF4-FFF2-40B4-BE49-F238E27FC236}">
+                <a16:creationId xmlns:a16="http://schemas.microsoft.com/office/drawing/2014/main" id="{0D009318-34ED-49EB-AE04-BFB438B5A519}"/>
+              </a:ext>
+            </a:extLst>
+          </p:cNvPr>
+          <p:cNvSpPr txBox="1"/>
+          <p:nvPr/>
+        </p:nvSpPr>
+        <p:spPr>
+          <a:xfrm>
+            <a:off x="1051264" y="233661"/>
+            <a:ext cx="10515600" cy="707886"/>
+          </a:xfrm>
+          <a:prstGeom prst="rect">
+            <a:avLst/>
+          </a:prstGeom>
+          <a:solidFill>
+            <a:schemeClr val="tx1">
+              <a:lumMod val="65000"/>
+              <a:lumOff val="35000"/>
+            </a:schemeClr>
+          </a:solidFill>
+        </p:spPr>
+        <p:txBody>
+          <a:bodyPr wrap="square" rtlCol="0">
+            <a:spAutoFit/>
+          </a:bodyPr>
+          <a:lstStyle/>
+          <a:p>
+            <a:pPr algn="ctr"/>
+            <a:r>
+              <a:rPr lang="en-GB" sz="4000" dirty="0">
+                <a:solidFill>
+                  <a:schemeClr val="bg1"/>
+                </a:solidFill>
+              </a:rPr>
+              <a:t>Power BI for Business Users</a:t>
+            </a:r>
+            <a:endParaRPr lang="en-GB" sz="3600" dirty="0">
+              <a:solidFill>
+                <a:schemeClr val="bg1"/>
+              </a:solidFill>
+            </a:endParaRPr>
+          </a:p>
+        </p:txBody>
+      </p:sp>
+      <p:pic>
+        <p:nvPicPr>
+          <p:cNvPr id="10" name="Picture 9">
+            <a:extLst>
+              <a:ext uri="{FF2B5EF4-FFF2-40B4-BE49-F238E27FC236}">
+                <a16:creationId xmlns:a16="http://schemas.microsoft.com/office/drawing/2014/main" id="{804755C9-ADB0-4B3B-9C9F-8DDD97BA97A6}"/>
+              </a:ext>
+            </a:extLst>
+          </p:cNvPr>
+          <p:cNvPicPr>
+            <a:picLocks noChangeAspect="1"/>
+          </p:cNvPicPr>
+          <p:nvPr/>
+        </p:nvPicPr>
+        <p:blipFill>
+          <a:blip r:embed="rId2"/>
+          <a:stretch>
+            <a:fillRect/>
+          </a:stretch>
+        </p:blipFill>
+        <p:spPr>
+          <a:xfrm>
+            <a:off x="6160499" y="1636888"/>
+            <a:ext cx="5490395" cy="4572001"/>
+          </a:xfrm>
+          <a:prstGeom prst="rect">
+            <a:avLst/>
+          </a:prstGeom>
+        </p:spPr>
+      </p:pic>
+      <p:sp>
+        <p:nvSpPr>
+          <p:cNvPr id="11" name="TextBox 10">
+            <a:extLst>
+              <a:ext uri="{FF2B5EF4-FFF2-40B4-BE49-F238E27FC236}">
+                <a16:creationId xmlns:a16="http://schemas.microsoft.com/office/drawing/2014/main" id="{74ABBA3D-C7C0-4F0E-BBF0-9A5B5B67D08B}"/>
+              </a:ext>
+            </a:extLst>
+          </p:cNvPr>
+          <p:cNvSpPr txBox="1"/>
+          <p:nvPr/>
+        </p:nvSpPr>
+        <p:spPr>
+          <a:xfrm>
+            <a:off x="1051264" y="1431211"/>
+            <a:ext cx="5044736" cy="2585323"/>
+          </a:xfrm>
+          <a:prstGeom prst="rect">
+            <a:avLst/>
+          </a:prstGeom>
+          <a:solidFill>
+            <a:schemeClr val="accent4"/>
+          </a:solidFill>
+        </p:spPr>
+        <p:txBody>
+          <a:bodyPr wrap="square" rtlCol="0">
+            <a:spAutoFit/>
+          </a:bodyPr>
+          <a:lstStyle/>
+          <a:p>
+            <a:pPr algn="ctr"/>
+            <a:r>
+              <a:rPr lang="en-GB" sz="5400" dirty="0"/>
+              <a:t>POWER BI</a:t>
+            </a:r>
+          </a:p>
+          <a:p>
+            <a:pPr algn="ctr"/>
+            <a:r>
+              <a:rPr lang="en-GB" sz="5400" dirty="0"/>
+              <a:t>FOR</a:t>
+            </a:r>
+          </a:p>
+          <a:p>
+            <a:pPr algn="ctr"/>
+            <a:r>
+              <a:rPr lang="en-GB" sz="5400" dirty="0"/>
+              <a:t>BUSINESS USERS</a:t>
+            </a:r>
+          </a:p>
+        </p:txBody>
+      </p:sp>
+      <p:sp>
+        <p:nvSpPr>
+          <p:cNvPr id="12" name="TextBox 11">
+            <a:extLst>
+              <a:ext uri="{FF2B5EF4-FFF2-40B4-BE49-F238E27FC236}">
+                <a16:creationId xmlns:a16="http://schemas.microsoft.com/office/drawing/2014/main" id="{E0E5AD75-6BDE-45F0-AA61-2986449B1B81}"/>
+              </a:ext>
+            </a:extLst>
+          </p:cNvPr>
+          <p:cNvSpPr txBox="1"/>
+          <p:nvPr/>
+        </p:nvSpPr>
+        <p:spPr>
+          <a:xfrm>
+            <a:off x="1051264" y="4134127"/>
+            <a:ext cx="5044736" cy="2585323"/>
+          </a:xfrm>
+          <a:prstGeom prst="rect">
+            <a:avLst/>
+          </a:prstGeom>
+          <a:solidFill>
+            <a:schemeClr val="tx1"/>
+          </a:solidFill>
+        </p:spPr>
+        <p:txBody>
+          <a:bodyPr wrap="square" rtlCol="0">
+            <a:spAutoFit/>
+          </a:bodyPr>
+          <a:lstStyle/>
+          <a:p>
+            <a:pPr algn="ctr"/>
+            <a:r>
+              <a:rPr lang="en-GB" sz="5400" dirty="0">
+                <a:solidFill>
+                  <a:schemeClr val="bg1"/>
+                </a:solidFill>
+              </a:rPr>
+              <a:t>MONDAY 25</a:t>
+            </a:r>
+            <a:r>
+              <a:rPr lang="en-GB" sz="5400" baseline="30000" dirty="0">
+                <a:solidFill>
+                  <a:schemeClr val="bg1"/>
+                </a:solidFill>
+              </a:rPr>
+              <a:t>th</a:t>
+            </a:r>
+            <a:r>
+              <a:rPr lang="en-GB" sz="5400" dirty="0">
+                <a:solidFill>
+                  <a:schemeClr val="bg1"/>
+                </a:solidFill>
+              </a:rPr>
+              <a:t> OCT</a:t>
+            </a:r>
+          </a:p>
+          <a:p>
+            <a:pPr algn="ctr"/>
+            <a:r>
+              <a:rPr lang="en-GB" sz="5400" dirty="0">
+                <a:solidFill>
+                  <a:schemeClr val="bg1"/>
+                </a:solidFill>
+              </a:rPr>
+              <a:t>17:00 GMT</a:t>
+            </a:r>
+          </a:p>
+        </p:txBody>
+      </p:sp>
+    </p:spTree>
+    <p:extLst>
+      <p:ext uri="{BB962C8B-B14F-4D97-AF65-F5344CB8AC3E}">
+        <p14:creationId xmlns:p14="http://schemas.microsoft.com/office/powerpoint/2010/main" val="2816683142"/>
+      </p:ext>
+    </p:extLst>
+  </p:cSld>
+  <p:clrMapOvr>
+    <a:masterClrMapping/>
+  </p:clrMapOvr>
+</p:sld>
+</file>
+
+<file path=ppt/slides/slide41.xml><?xml version="1.0" encoding="utf-8"?>
+<p:sld xmlns:a="http://schemas.openxmlformats.org/drawingml/2006/main" xmlns:r="http://schemas.openxmlformats.org/officeDocument/2006/relationships" xmlns:p="http://schemas.openxmlformats.org/presentationml/2006/main">
+  <p:cSld>
+    <p:spTree>
+      <p:nvGrpSpPr>
+        <p:cNvPr id="1" name=""/>
+        <p:cNvGrpSpPr/>
+        <p:nvPr/>
+      </p:nvGrpSpPr>
+      <p:grpSpPr>
+        <a:xfrm>
+          <a:off x="0" y="0"/>
+          <a:ext cx="0" cy="0"/>
+          <a:chOff x="0" y="0"/>
+          <a:chExt cx="0" cy="0"/>
+        </a:xfrm>
+      </p:grpSpPr>
+      <p:sp>
+        <p:nvSpPr>
+          <p:cNvPr id="2" name="Title 1">
+            <a:extLst>
+              <a:ext uri="{FF2B5EF4-FFF2-40B4-BE49-F238E27FC236}">
+                <a16:creationId xmlns:a16="http://schemas.microsoft.com/office/drawing/2014/main" id="{EB411E83-E42A-42B6-BD7D-C5FA24565652}"/>
+              </a:ext>
+            </a:extLst>
+          </p:cNvPr>
+          <p:cNvSpPr>
+            <a:spLocks noGrp="1"/>
+          </p:cNvSpPr>
+          <p:nvPr>
+            <p:ph type="title"/>
+          </p:nvPr>
+        </p:nvSpPr>
+        <p:spPr>
+          <a:xfrm>
+            <a:off x="838200" y="112158"/>
+            <a:ext cx="10515600" cy="735706"/>
+          </a:xfrm>
+        </p:spPr>
+        <p:txBody>
+          <a:bodyPr/>
+          <a:lstStyle/>
+          <a:p>
+            <a:r>
+              <a:rPr lang="en-GB" dirty="0"/>
+              <a:t>PBI Desktop, PBI Service, PBI Mobile apps</a:t>
+            </a:r>
+          </a:p>
+        </p:txBody>
+      </p:sp>
+      <p:pic>
+        <p:nvPicPr>
+          <p:cNvPr id="5" name="Picture 4">
+            <a:extLst>
+              <a:ext uri="{FF2B5EF4-FFF2-40B4-BE49-F238E27FC236}">
+                <a16:creationId xmlns:a16="http://schemas.microsoft.com/office/drawing/2014/main" id="{535A30B2-59D6-44B3-A5E5-2211DA072E22}"/>
+              </a:ext>
+            </a:extLst>
+          </p:cNvPr>
+          <p:cNvPicPr>
+            <a:picLocks noChangeAspect="1"/>
+          </p:cNvPicPr>
+          <p:nvPr/>
+        </p:nvPicPr>
+        <p:blipFill>
+          <a:blip r:embed="rId2">
+            <a:extLst>
+              <a:ext uri="{28A0092B-C50C-407E-A947-70E740481C1C}">
+                <a14:useLocalDpi xmlns:a14="http://schemas.microsoft.com/office/drawing/2010/main" val="0"/>
+              </a:ext>
+            </a:extLst>
+          </a:blip>
+          <a:stretch>
+            <a:fillRect/>
+          </a:stretch>
+        </p:blipFill>
+        <p:spPr>
+          <a:xfrm>
+            <a:off x="-1" y="727223"/>
+            <a:ext cx="11061577" cy="6018620"/>
+          </a:xfrm>
+          <a:prstGeom prst="rect">
+            <a:avLst/>
+          </a:prstGeom>
+        </p:spPr>
+      </p:pic>
+      <p:pic>
+        <p:nvPicPr>
+          <p:cNvPr id="4" name="Content Placeholder 4">
+            <a:extLst>
+              <a:ext uri="{FF2B5EF4-FFF2-40B4-BE49-F238E27FC236}">
+                <a16:creationId xmlns:a16="http://schemas.microsoft.com/office/drawing/2014/main" id="{96783690-B936-4A3D-AEC5-D7F361D37A85}"/>
+              </a:ext>
+            </a:extLst>
+          </p:cNvPr>
+          <p:cNvPicPr>
+            <a:picLocks noChangeAspect="1"/>
+          </p:cNvPicPr>
+          <p:nvPr/>
+        </p:nvPicPr>
+        <p:blipFill>
+          <a:blip r:embed="rId3">
+            <a:extLst>
+              <a:ext uri="{28A0092B-C50C-407E-A947-70E740481C1C}">
+                <a14:useLocalDpi xmlns:a14="http://schemas.microsoft.com/office/drawing/2010/main" val="0"/>
+              </a:ext>
+            </a:extLst>
+          </a:blip>
+          <a:stretch>
+            <a:fillRect/>
+          </a:stretch>
+        </p:blipFill>
+        <p:spPr>
+          <a:xfrm>
+            <a:off x="9683527" y="5953125"/>
+            <a:ext cx="2383530" cy="786624"/>
+          </a:xfrm>
+          <a:prstGeom prst="rect">
+            <a:avLst/>
+          </a:prstGeom>
+        </p:spPr>
+      </p:pic>
+    </p:spTree>
+    <p:extLst>
+      <p:ext uri="{BB962C8B-B14F-4D97-AF65-F5344CB8AC3E}">
+        <p14:creationId xmlns:p14="http://schemas.microsoft.com/office/powerpoint/2010/main" val="1750693871"/>
+      </p:ext>
+    </p:extLst>
+  </p:cSld>
+  <p:clrMapOvr>
+    <a:masterClrMapping/>
+  </p:clrMapOvr>
+</p:sld>
+</file>
+
+<file path=ppt/slides/slide42.xml><?xml version="1.0" encoding="utf-8"?>
+<p:sld xmlns:a="http://schemas.openxmlformats.org/drawingml/2006/main" xmlns:r="http://schemas.openxmlformats.org/officeDocument/2006/relationships" xmlns:p="http://schemas.openxmlformats.org/presentationml/2006/main">
+  <p:cSld>
+    <p:spTree>
+      <p:nvGrpSpPr>
+        <p:cNvPr id="1" name=""/>
+        <p:cNvGrpSpPr/>
+        <p:nvPr/>
+      </p:nvGrpSpPr>
+      <p:grpSpPr>
+        <a:xfrm>
+          <a:off x="0" y="0"/>
+          <a:ext cx="0" cy="0"/>
+          <a:chOff x="0" y="0"/>
+          <a:chExt cx="0" cy="0"/>
+        </a:xfrm>
+      </p:grpSpPr>
+      <p:sp>
+        <p:nvSpPr>
+          <p:cNvPr id="3" name="Content Placeholder 2">
+            <a:extLst>
+              <a:ext uri="{FF2B5EF4-FFF2-40B4-BE49-F238E27FC236}">
+                <a16:creationId xmlns:a16="http://schemas.microsoft.com/office/drawing/2014/main" id="{40963E1F-A60C-4F59-9E1F-8008ED3E9CA9}"/>
+              </a:ext>
+            </a:extLst>
+          </p:cNvPr>
+          <p:cNvSpPr>
+            <a:spLocks noGrp="1"/>
+          </p:cNvSpPr>
+          <p:nvPr>
+            <p:ph idx="1"/>
+          </p:nvPr>
+        </p:nvSpPr>
+        <p:spPr>
+          <a:xfrm>
+            <a:off x="1051264" y="1287262"/>
+            <a:ext cx="10515600" cy="3957545"/>
+          </a:xfrm>
+        </p:spPr>
+        <p:txBody>
+          <a:bodyPr>
+            <a:normAutofit lnSpcReduction="10000"/>
+          </a:bodyPr>
+          <a:lstStyle/>
+          <a:p>
+            <a:r>
+              <a:rPr lang="en-GB" dirty="0"/>
+              <a:t>Back in Power BI Desktop</a:t>
+            </a:r>
+          </a:p>
+          <a:p>
+            <a:r>
+              <a:rPr lang="en-GB" dirty="0"/>
+              <a:t>open .</a:t>
+            </a:r>
+            <a:r>
+              <a:rPr lang="en-GB" dirty="0" err="1"/>
+              <a:t>pbix</a:t>
+            </a:r>
+            <a:r>
+              <a:rPr lang="en-GB" dirty="0"/>
+              <a:t> then Click Publish</a:t>
+            </a:r>
+          </a:p>
+          <a:p>
+            <a:r>
+              <a:rPr lang="en-GB" dirty="0"/>
+              <a:t>Select My Workspace and click confirm.</a:t>
+            </a:r>
+          </a:p>
+          <a:p>
+            <a:r>
+              <a:rPr lang="en-GB" dirty="0"/>
+              <a:t>Check success message</a:t>
+            </a:r>
+          </a:p>
+          <a:p>
+            <a:r>
+              <a:rPr lang="en-GB" dirty="0" err="1"/>
+              <a:t>Goto</a:t>
+            </a:r>
+            <a:r>
+              <a:rPr lang="en-GB" dirty="0"/>
+              <a:t> </a:t>
+            </a:r>
+            <a:r>
+              <a:rPr lang="en-GB" dirty="0">
+                <a:hlinkClick r:id="rId2"/>
+              </a:rPr>
+              <a:t>www.powerbi.com</a:t>
+            </a:r>
+            <a:endParaRPr lang="en-GB" dirty="0"/>
+          </a:p>
+          <a:p>
+            <a:r>
+              <a:rPr lang="en-GB" dirty="0"/>
+              <a:t>Open My Workspace</a:t>
+            </a:r>
+          </a:p>
+          <a:p>
+            <a:r>
+              <a:rPr lang="en-GB" dirty="0"/>
+              <a:t>See you report</a:t>
+            </a:r>
+          </a:p>
+          <a:p>
+            <a:r>
+              <a:rPr lang="en-GB" dirty="0"/>
+              <a:t>Navigate report</a:t>
+            </a:r>
+          </a:p>
+        </p:txBody>
+      </p:sp>
+      <p:sp>
+        <p:nvSpPr>
+          <p:cNvPr id="4" name="TextBox 3">
+            <a:extLst>
+              <a:ext uri="{FF2B5EF4-FFF2-40B4-BE49-F238E27FC236}">
+                <a16:creationId xmlns:a16="http://schemas.microsoft.com/office/drawing/2014/main" id="{0D009318-34ED-49EB-AE04-BFB438B5A519}"/>
+              </a:ext>
+            </a:extLst>
+          </p:cNvPr>
+          <p:cNvSpPr txBox="1"/>
+          <p:nvPr/>
+        </p:nvSpPr>
+        <p:spPr>
+          <a:xfrm>
+            <a:off x="1051264" y="118251"/>
+            <a:ext cx="10515600" cy="954107"/>
+          </a:xfrm>
+          <a:prstGeom prst="rect">
+            <a:avLst/>
+          </a:prstGeom>
+          <a:solidFill>
+            <a:schemeClr val="tx1">
+              <a:lumMod val="65000"/>
+              <a:lumOff val="35000"/>
+            </a:schemeClr>
+          </a:solidFill>
+        </p:spPr>
+        <p:txBody>
+          <a:bodyPr wrap="square" rtlCol="0">
+            <a:spAutoFit/>
+          </a:bodyPr>
+          <a:lstStyle/>
+          <a:p>
+            <a:pPr algn="ctr"/>
+            <a:r>
+              <a:rPr lang="en-GB" sz="3200" dirty="0">
+                <a:solidFill>
+                  <a:schemeClr val="bg1"/>
+                </a:solidFill>
+              </a:rPr>
+              <a:t>Publish to Power BI</a:t>
+            </a:r>
+          </a:p>
+          <a:p>
+            <a:pPr algn="ctr"/>
+            <a:r>
+              <a:rPr lang="en-GB" sz="2400" dirty="0">
+                <a:solidFill>
+                  <a:schemeClr val="bg1"/>
+                </a:solidFill>
+              </a:rPr>
+              <a:t>.</a:t>
+            </a:r>
+            <a:r>
+              <a:rPr lang="en-GB" sz="2400" dirty="0" err="1">
+                <a:solidFill>
+                  <a:schemeClr val="bg1"/>
+                </a:solidFill>
+              </a:rPr>
+              <a:t>pbix</a:t>
+            </a:r>
+            <a:r>
+              <a:rPr lang="en-GB" sz="2400" dirty="0">
+                <a:solidFill>
+                  <a:schemeClr val="bg1"/>
+                </a:solidFill>
+              </a:rPr>
+              <a:t> report</a:t>
+            </a:r>
+          </a:p>
+        </p:txBody>
+      </p:sp>
+      <p:pic>
+        <p:nvPicPr>
+          <p:cNvPr id="5" name="Content Placeholder 4">
+            <a:extLst>
+              <a:ext uri="{FF2B5EF4-FFF2-40B4-BE49-F238E27FC236}">
+                <a16:creationId xmlns:a16="http://schemas.microsoft.com/office/drawing/2014/main" id="{4269D105-DF79-4155-8D48-871BC7889B59}"/>
+              </a:ext>
+            </a:extLst>
+          </p:cNvPr>
+          <p:cNvPicPr>
+            <a:picLocks noChangeAspect="1"/>
+          </p:cNvPicPr>
+          <p:nvPr/>
+        </p:nvPicPr>
+        <p:blipFill>
+          <a:blip r:embed="rId3">
+            <a:extLst>
+              <a:ext uri="{28A0092B-C50C-407E-A947-70E740481C1C}">
+                <a14:useLocalDpi xmlns:a14="http://schemas.microsoft.com/office/drawing/2010/main" val="0"/>
+              </a:ext>
+            </a:extLst>
+          </a:blip>
+          <a:stretch>
+            <a:fillRect/>
+          </a:stretch>
+        </p:blipFill>
+        <p:spPr>
+          <a:xfrm>
+            <a:off x="9683527" y="5953125"/>
+            <a:ext cx="2383530" cy="786624"/>
+          </a:xfrm>
+          <a:prstGeom prst="rect">
+            <a:avLst/>
+          </a:prstGeom>
+        </p:spPr>
+      </p:pic>
+      <p:pic>
+        <p:nvPicPr>
+          <p:cNvPr id="6" name="Picture 5" descr="Icon&#10;&#10;Description automatically generated">
+            <a:extLst>
+              <a:ext uri="{FF2B5EF4-FFF2-40B4-BE49-F238E27FC236}">
+                <a16:creationId xmlns:a16="http://schemas.microsoft.com/office/drawing/2014/main" id="{0816A520-544D-4737-ABB2-A2B9C620CADF}"/>
+              </a:ext>
+            </a:extLst>
+          </p:cNvPr>
+          <p:cNvPicPr>
+            <a:picLocks noChangeAspect="1"/>
+          </p:cNvPicPr>
+          <p:nvPr/>
+        </p:nvPicPr>
+        <p:blipFill>
+          <a:blip r:embed="rId4">
+            <a:extLst>
+              <a:ext uri="{28A0092B-C50C-407E-A947-70E740481C1C}">
+                <a14:useLocalDpi xmlns:a14="http://schemas.microsoft.com/office/drawing/2010/main" val="0"/>
+              </a:ext>
+            </a:extLst>
+          </a:blip>
+          <a:stretch>
+            <a:fillRect/>
+          </a:stretch>
+        </p:blipFill>
+        <p:spPr>
+          <a:xfrm>
+            <a:off x="9485264" y="1201066"/>
+            <a:ext cx="2367368" cy="1242868"/>
+          </a:xfrm>
+          <a:prstGeom prst="rect">
+            <a:avLst/>
+          </a:prstGeom>
+        </p:spPr>
+      </p:pic>
+      <p:pic>
+        <p:nvPicPr>
+          <p:cNvPr id="8" name="Picture 7">
+            <a:extLst>
+              <a:ext uri="{FF2B5EF4-FFF2-40B4-BE49-F238E27FC236}">
+                <a16:creationId xmlns:a16="http://schemas.microsoft.com/office/drawing/2014/main" id="{9296038C-0A6D-45C4-A184-717E681EC0E5}"/>
+              </a:ext>
+            </a:extLst>
+          </p:cNvPr>
+          <p:cNvPicPr>
+            <a:picLocks noChangeAspect="1"/>
+          </p:cNvPicPr>
+          <p:nvPr/>
+        </p:nvPicPr>
+        <p:blipFill>
+          <a:blip r:embed="rId5"/>
+          <a:stretch>
+            <a:fillRect/>
+          </a:stretch>
+        </p:blipFill>
+        <p:spPr>
+          <a:xfrm>
+            <a:off x="5817099" y="2830046"/>
+            <a:ext cx="4726480" cy="1335057"/>
+          </a:xfrm>
+          <a:prstGeom prst="rect">
+            <a:avLst/>
+          </a:prstGeom>
+        </p:spPr>
+      </p:pic>
+      <p:pic>
+        <p:nvPicPr>
+          <p:cNvPr id="10" name="Picture 9">
+            <a:extLst>
+              <a:ext uri="{FF2B5EF4-FFF2-40B4-BE49-F238E27FC236}">
+                <a16:creationId xmlns:a16="http://schemas.microsoft.com/office/drawing/2014/main" id="{8F7A1511-3F90-47CD-8E23-590BF66C043C}"/>
+              </a:ext>
+            </a:extLst>
+          </p:cNvPr>
+          <p:cNvPicPr>
+            <a:picLocks noChangeAspect="1"/>
+          </p:cNvPicPr>
+          <p:nvPr/>
+        </p:nvPicPr>
+        <p:blipFill>
+          <a:blip r:embed="rId6"/>
+          <a:stretch>
+            <a:fillRect/>
+          </a:stretch>
+        </p:blipFill>
+        <p:spPr>
+          <a:xfrm>
+            <a:off x="7256414" y="1305575"/>
+            <a:ext cx="923925" cy="1438275"/>
+          </a:xfrm>
+          <a:prstGeom prst="rect">
+            <a:avLst/>
+          </a:prstGeom>
+        </p:spPr>
+      </p:pic>
+      <p:pic>
+        <p:nvPicPr>
+          <p:cNvPr id="12" name="Picture 11">
+            <a:extLst>
+              <a:ext uri="{FF2B5EF4-FFF2-40B4-BE49-F238E27FC236}">
+                <a16:creationId xmlns:a16="http://schemas.microsoft.com/office/drawing/2014/main" id="{161DF966-9495-43C4-AF20-17F2CECE1362}"/>
+              </a:ext>
+            </a:extLst>
+          </p:cNvPr>
+          <p:cNvPicPr>
+            <a:picLocks noChangeAspect="1"/>
+          </p:cNvPicPr>
+          <p:nvPr/>
+        </p:nvPicPr>
+        <p:blipFill>
+          <a:blip r:embed="rId7"/>
+          <a:stretch>
+            <a:fillRect/>
+          </a:stretch>
+        </p:blipFill>
+        <p:spPr>
+          <a:xfrm>
+            <a:off x="1262062" y="5160665"/>
+            <a:ext cx="3529013" cy="1584920"/>
+          </a:xfrm>
+          <a:prstGeom prst="rect">
+            <a:avLst/>
+          </a:prstGeom>
+        </p:spPr>
+      </p:pic>
+      <p:pic>
+        <p:nvPicPr>
+          <p:cNvPr id="14" name="Picture 13">
+            <a:extLst>
+              <a:ext uri="{FF2B5EF4-FFF2-40B4-BE49-F238E27FC236}">
+                <a16:creationId xmlns:a16="http://schemas.microsoft.com/office/drawing/2014/main" id="{69C80AA7-9430-4AC2-A4BB-9D43E89A361A}"/>
+              </a:ext>
+            </a:extLst>
+          </p:cNvPr>
+          <p:cNvPicPr>
+            <a:picLocks noChangeAspect="1"/>
+          </p:cNvPicPr>
+          <p:nvPr/>
+        </p:nvPicPr>
+        <p:blipFill>
+          <a:blip r:embed="rId8"/>
+          <a:stretch>
+            <a:fillRect/>
+          </a:stretch>
+        </p:blipFill>
+        <p:spPr>
+          <a:xfrm>
+            <a:off x="5809960" y="4783571"/>
+            <a:ext cx="3529013" cy="1956178"/>
+          </a:xfrm>
+          <a:prstGeom prst="rect">
+            <a:avLst/>
+          </a:prstGeom>
+        </p:spPr>
+      </p:pic>
+    </p:spTree>
+    <p:extLst>
+      <p:ext uri="{BB962C8B-B14F-4D97-AF65-F5344CB8AC3E}">
+        <p14:creationId xmlns:p14="http://schemas.microsoft.com/office/powerpoint/2010/main" val="1281827120"/>
+      </p:ext>
+    </p:extLst>
+  </p:cSld>
+  <p:clrMapOvr>
+    <a:masterClrMapping/>
+  </p:clrMapOvr>
+</p:sld>
+</file>
+
+<file path=ppt/slides/slide43.xml><?xml version="1.0" encoding="utf-8"?>
+<p:sld xmlns:a="http://schemas.openxmlformats.org/drawingml/2006/main" xmlns:r="http://schemas.openxmlformats.org/officeDocument/2006/relationships" xmlns:p="http://schemas.openxmlformats.org/presentationml/2006/main">
+  <p:cSld>
+    <p:spTree>
+      <p:nvGrpSpPr>
+        <p:cNvPr id="1" name=""/>
+        <p:cNvGrpSpPr/>
+        <p:nvPr/>
+      </p:nvGrpSpPr>
+      <p:grpSpPr>
+        <a:xfrm>
+          <a:off x="0" y="0"/>
+          <a:ext cx="0" cy="0"/>
+          <a:chOff x="0" y="0"/>
+          <a:chExt cx="0" cy="0"/>
+        </a:xfrm>
+      </p:grpSpPr>
+      <p:sp>
+        <p:nvSpPr>
+          <p:cNvPr id="2" name="Title 1">
+            <a:extLst>
+              <a:ext uri="{FF2B5EF4-FFF2-40B4-BE49-F238E27FC236}">
+                <a16:creationId xmlns:a16="http://schemas.microsoft.com/office/drawing/2014/main" id="{B47FDD0F-CBB9-40BD-9867-2904FBBF02D3}"/>
+              </a:ext>
+            </a:extLst>
+          </p:cNvPr>
+          <p:cNvSpPr>
+            <a:spLocks noGrp="1"/>
+          </p:cNvSpPr>
+          <p:nvPr>
+            <p:ph type="title"/>
+          </p:nvPr>
+        </p:nvSpPr>
+        <p:spPr/>
+        <p:txBody>
+          <a:bodyPr/>
+          <a:lstStyle/>
+          <a:p>
+            <a:r>
+              <a:rPr lang="en-GB" dirty="0"/>
+              <a:t>The End</a:t>
+            </a:r>
+          </a:p>
+        </p:txBody>
+      </p:sp>
+      <p:pic>
+        <p:nvPicPr>
+          <p:cNvPr id="6" name="Online Media 5" title="Thats all Folks (Rare)">
+            <a:hlinkClick r:id="" action="ppaction://media"/>
+            <a:extLst>
+              <a:ext uri="{FF2B5EF4-FFF2-40B4-BE49-F238E27FC236}">
+                <a16:creationId xmlns:a16="http://schemas.microsoft.com/office/drawing/2014/main" id="{CE4314A2-C148-4820-8A92-F2A455447FEE}"/>
+              </a:ext>
+            </a:extLst>
+          </p:cNvPr>
+          <p:cNvPicPr>
+            <a:picLocks noRot="1" noChangeAspect="1"/>
+          </p:cNvPicPr>
+          <p:nvPr>
+            <a:videoFile r:link="rId1"/>
+          </p:nvPr>
+        </p:nvPicPr>
+        <p:blipFill>
+          <a:blip r:embed="rId3"/>
+          <a:stretch>
+            <a:fillRect/>
+          </a:stretch>
+        </p:blipFill>
+        <p:spPr>
+          <a:xfrm>
+            <a:off x="3048000" y="1714500"/>
+            <a:ext cx="6096000" cy="3429000"/>
+          </a:xfrm>
+          <a:prstGeom prst="rect">
+            <a:avLst/>
+          </a:prstGeom>
+        </p:spPr>
+      </p:pic>
+      <p:pic>
+        <p:nvPicPr>
+          <p:cNvPr id="4" name="Content Placeholder 4">
+            <a:extLst>
+              <a:ext uri="{FF2B5EF4-FFF2-40B4-BE49-F238E27FC236}">
+                <a16:creationId xmlns:a16="http://schemas.microsoft.com/office/drawing/2014/main" id="{A26EAD1F-A79C-4A41-BF98-239E74362EA5}"/>
+              </a:ext>
+            </a:extLst>
+          </p:cNvPr>
+          <p:cNvPicPr>
+            <a:picLocks noChangeAspect="1"/>
+          </p:cNvPicPr>
+          <p:nvPr/>
+        </p:nvPicPr>
+        <p:blipFill>
+          <a:blip r:embed="rId4">
+            <a:extLst>
+              <a:ext uri="{28A0092B-C50C-407E-A947-70E740481C1C}">
+                <a14:useLocalDpi xmlns:a14="http://schemas.microsoft.com/office/drawing/2010/main" val="0"/>
+              </a:ext>
+            </a:extLst>
+          </a:blip>
+          <a:stretch>
+            <a:fillRect/>
+          </a:stretch>
+        </p:blipFill>
+        <p:spPr>
+          <a:xfrm>
+            <a:off x="9683527" y="5953125"/>
+            <a:ext cx="2383530" cy="786624"/>
+          </a:xfrm>
+          <a:prstGeom prst="rect">
+            <a:avLst/>
+          </a:prstGeom>
+        </p:spPr>
+      </p:pic>
+    </p:spTree>
+    <p:extLst>
+      <p:ext uri="{BB962C8B-B14F-4D97-AF65-F5344CB8AC3E}">
+        <p14:creationId xmlns:p14="http://schemas.microsoft.com/office/powerpoint/2010/main" val="55676127"/>
+      </p:ext>
+    </p:extLst>
+  </p:cSld>
+  <p:clrMapOvr>
+    <a:masterClrMapping/>
+  </p:clrMapOvr>
+  <p:timing>
+    <p:tnLst>
+      <p:par>
+        <p:cTn id="1" dur="indefinite" restart="never" nodeType="tmRoot">
+          <p:childTnLst>
+            <p:seq concurrent="1" nextAc="seek">
+              <p:cTn id="2" dur="indefinite" nodeType="mainSeq">
+                <p:childTnLst>
+                  <p:par>
+                    <p:cTn id="3" fill="hold">
+                      <p:stCondLst>
+                        <p:cond delay="indefinite"/>
+                      </p:stCondLst>
+                      <p:childTnLst>
+                        <p:par>
+                          <p:cTn id="4" fill="hold">
+                            <p:stCondLst>
+                              <p:cond delay="0"/>
+                            </p:stCondLst>
+                            <p:childTnLst>
+                              <p:par>
+                                <p:cTn id="5" presetID="1" presetClass="mediacall" presetSubtype="0" fill="hold" nodeType="clickEffect">
+                                  <p:stCondLst>
+                                    <p:cond delay="0"/>
+                                  </p:stCondLst>
+                                  <p:childTnLst>
+                                    <p:cmd type="call" cmd="playFrom(0.0)">
+                                      <p:cBhvr>
+                                        <p:cTn id="6" dur="1" fill="hold"/>
+                                        <p:tgtEl>
+                                          <p:spTgt spid="6"/>
+                                        </p:tgtEl>
+                                      </p:cBhvr>
+                                    </p:cmd>
+                                  </p:childTnLst>
+                                </p:cTn>
+                              </p:par>
+                            </p:childTnLst>
+                          </p:cTn>
+                        </p:par>
+                      </p:childTnLst>
+                    </p:cTn>
+                  </p:par>
+                </p:childTnLst>
+              </p:cTn>
+              <p:prevCondLst>
+                <p:cond evt="onPrev" delay="0">
+                  <p:tgtEl>
+                    <p:sldTgt/>
+                  </p:tgtEl>
+                </p:cond>
+              </p:prevCondLst>
+              <p:nextCondLst>
+                <p:cond evt="onNext" delay="0">
+                  <p:tgtEl>
+                    <p:sldTgt/>
+                  </p:tgtEl>
+                </p:cond>
+              </p:nextCondLst>
+            </p:seq>
+            <p:video>
+              <p:cMediaNode vol="80000">
+                <p:cTn id="7" fill="hold" display="0">
+                  <p:stCondLst>
+                    <p:cond delay="indefinite"/>
+                  </p:stCondLst>
+                </p:cTn>
+                <p:tgtEl>
+                  <p:spTgt spid="6"/>
+                </p:tgtEl>
+              </p:cMediaNode>
+            </p:video>
+            <p:seq concurrent="1" nextAc="seek">
+              <p:cTn id="8" restart="whenNotActive" fill="hold" evtFilter="cancelBubble" nodeType="interactiveSeq">
+                <p:stCondLst>
+                  <p:cond evt="onClick" delay="0">
+                    <p:tgtEl>
+                      <p:spTgt spid="6"/>
+                    </p:tgtEl>
+                  </p:cond>
+                </p:stCondLst>
+                <p:endSync evt="end" delay="0">
+                  <p:rtn val="all"/>
+                </p:endSync>
+                <p:childTnLst>
+                  <p:par>
+                    <p:cTn id="9" fill="hold">
+                      <p:stCondLst>
+                        <p:cond delay="0"/>
+                      </p:stCondLst>
+                      <p:childTnLst>
+                        <p:par>
+                          <p:cTn id="10" fill="hold">
+                            <p:stCondLst>
+                              <p:cond delay="0"/>
+                            </p:stCondLst>
+                            <p:childTnLst>
+                              <p:par>
+                                <p:cTn id="11" presetID="2" presetClass="mediacall" presetSubtype="0" fill="hold" nodeType="clickEffect">
+                                  <p:stCondLst>
+                                    <p:cond delay="0"/>
+                                  </p:stCondLst>
+                                  <p:childTnLst>
+                                    <p:cmd type="call" cmd="togglePause">
+                                      <p:cBhvr>
+                                        <p:cTn id="12" dur="1" fill="hold"/>
+                                        <p:tgtEl>
+                                          <p:spTgt spid="6"/>
+                                        </p:tgtEl>
+                                      </p:cBhvr>
+                                    </p:cmd>
+                                  </p:childTnLst>
+                                </p:cTn>
+                              </p:par>
+                            </p:childTnLst>
+                          </p:cTn>
+                        </p:par>
+                      </p:childTnLst>
+                    </p:cTn>
+                  </p:par>
+                </p:childTnLst>
+              </p:cTn>
+              <p:nextCondLst>
+                <p:cond evt="onClick" delay="0">
+                  <p:tgtEl>
+                    <p:spTgt spid="6"/>
+                  </p:tgtEl>
+                </p:cond>
+              </p:nextCondLst>
+            </p:seq>
+          </p:childTnLst>
+        </p:cTn>
+      </p:par>
+    </p:tnLst>
+  </p:timing>
+</p:sld>
+</file>
+
+<file path=ppt/slides/slide44.xml><?xml version="1.0" encoding="utf-8"?>
+<p:sld xmlns:a="http://schemas.openxmlformats.org/drawingml/2006/main" xmlns:r="http://schemas.openxmlformats.org/officeDocument/2006/relationships" xmlns:p="http://schemas.openxmlformats.org/presentationml/2006/main">
+  <p:cSld>
+    <p:spTree>
+      <p:nvGrpSpPr>
+        <p:cNvPr id="1" name=""/>
+        <p:cNvGrpSpPr/>
+        <p:nvPr/>
+      </p:nvGrpSpPr>
+      <p:grpSpPr>
+        <a:xfrm>
+          <a:off x="0" y="0"/>
+          <a:ext cx="0" cy="0"/>
+          <a:chOff x="0" y="0"/>
+          <a:chExt cx="0" cy="0"/>
+        </a:xfrm>
+      </p:grpSpPr>
+      <p:sp>
+        <p:nvSpPr>
+          <p:cNvPr id="2" name="Title 1">
+            <a:extLst>
+              <a:ext uri="{FF2B5EF4-FFF2-40B4-BE49-F238E27FC236}">
+                <a16:creationId xmlns:a16="http://schemas.microsoft.com/office/drawing/2014/main" id="{52741A15-161D-48E6-824E-99C6FC1D509E}"/>
+              </a:ext>
+            </a:extLst>
+          </p:cNvPr>
+          <p:cNvSpPr>
+            <a:spLocks noGrp="1"/>
+          </p:cNvSpPr>
+          <p:nvPr>
+            <p:ph type="title"/>
+          </p:nvPr>
+        </p:nvSpPr>
+        <p:spPr/>
+        <p:txBody>
+          <a:bodyPr/>
+          <a:lstStyle/>
+          <a:p>
+            <a:r>
+              <a:rPr lang="en-GB" dirty="0"/>
+              <a:t>Blank – end of Lesson</a:t>
+            </a:r>
+          </a:p>
+        </p:txBody>
+      </p:sp>
+    </p:spTree>
+    <p:extLst>
+      <p:ext uri="{BB962C8B-B14F-4D97-AF65-F5344CB8AC3E}">
+        <p14:creationId xmlns:p14="http://schemas.microsoft.com/office/powerpoint/2010/main" val="2465511143"/>
       </p:ext>
     </p:extLst>
   </p:cSld>

</xml_diff>